<commit_message>
Smart Audio City Guide na apresentação
</commit_message>
<xml_diff>
--- a/apresentacao.pptx
+++ b/apresentacao.pptx
@@ -145,6 +145,9 @@
         </p14:section>
       </p14:sectionLst>
     </p:ext>
+    <p:ext uri="{EFAFB233-063F-42B5-8137-9DF3F51BA10A}">
+      <p15:sldGuideLst xmlns:p15="http://schemas.microsoft.com/office/powerpoint/2012/main"/>
+    </p:ext>
   </p:extLst>
 </p:presentation>
 </file>
@@ -231,7 +234,7 @@
           <a:p>
             <a:fld id="{6BB15B15-C25E-44A5-AA8B-982210CB7094}" type="datetimeFigureOut">
               <a:rPr lang="pt-BR" smtClean="0"/>
-              <a:t>08/11/2013</a:t>
+              <a:t>09/11/2013</a:t>
             </a:fld>
             <a:endParaRPr lang="pt-BR"/>
           </a:p>
@@ -390,7 +393,7 @@
           <a:p>
             <a:fld id="{53070BC8-B87C-4DDF-9E69-F7B484BADD3A}" type="slidenum">
               <a:rPr lang="pt-BR" smtClean="0"/>
-              <a:t>‹nº›</a:t>
+              <a:t>‹#›</a:t>
             </a:fld>
             <a:endParaRPr lang="pt-BR"/>
           </a:p>
@@ -769,7 +772,7 @@
           <a:p>
             <a:fld id="{DBF08CCE-BA63-43DD-9A8F-D3A34D1C207B}" type="datetime1">
               <a:rPr lang="pt-BR" smtClean="0"/>
-              <a:t>08/11/2013</a:t>
+              <a:t>09/11/2013</a:t>
             </a:fld>
             <a:endParaRPr lang="pt-BR"/>
           </a:p>
@@ -811,7 +814,7 @@
           <a:p>
             <a:fld id="{B2372444-1707-4BD8-BE0A-F9F461ED2C3C}" type="slidenum">
               <a:rPr lang="pt-BR" smtClean="0"/>
-              <a:t>‹nº›</a:t>
+              <a:t>‹#›</a:t>
             </a:fld>
             <a:endParaRPr lang="pt-BR"/>
           </a:p>
@@ -1044,7 +1047,7 @@
           <a:p>
             <a:fld id="{06024363-0470-4741-AE36-6E80383105AB}" type="datetime1">
               <a:rPr lang="pt-BR" smtClean="0"/>
-              <a:t>08/11/2013</a:t>
+              <a:t>09/11/2013</a:t>
             </a:fld>
             <a:endParaRPr lang="pt-BR"/>
           </a:p>
@@ -1086,7 +1089,7 @@
           <a:p>
             <a:fld id="{B2372444-1707-4BD8-BE0A-F9F461ED2C3C}" type="slidenum">
               <a:rPr lang="pt-BR" smtClean="0"/>
-              <a:t>‹nº›</a:t>
+              <a:t>‹#›</a:t>
             </a:fld>
             <a:endParaRPr lang="pt-BR"/>
           </a:p>
@@ -1238,7 +1241,7 @@
           <a:p>
             <a:fld id="{77A60394-A8B1-4D3A-95EE-445A3470BB01}" type="datetime1">
               <a:rPr lang="pt-BR" smtClean="0"/>
-              <a:t>08/11/2013</a:t>
+              <a:t>09/11/2013</a:t>
             </a:fld>
             <a:endParaRPr lang="pt-BR"/>
           </a:p>
@@ -1280,7 +1283,7 @@
           <a:p>
             <a:fld id="{B2372444-1707-4BD8-BE0A-F9F461ED2C3C}" type="slidenum">
               <a:rPr lang="pt-BR" smtClean="0"/>
-              <a:t>‹nº›</a:t>
+              <a:t>‹#›</a:t>
             </a:fld>
             <a:endParaRPr lang="pt-BR"/>
           </a:p>
@@ -1511,7 +1514,7 @@
           <a:p>
             <a:fld id="{B4062BEB-6908-4461-BBFD-3C8D133B45DE}" type="datetime1">
               <a:rPr lang="pt-BR" smtClean="0"/>
-              <a:t>08/11/2013</a:t>
+              <a:t>09/11/2013</a:t>
             </a:fld>
             <a:endParaRPr lang="pt-BR"/>
           </a:p>
@@ -1553,7 +1556,7 @@
           <a:p>
             <a:fld id="{B2372444-1707-4BD8-BE0A-F9F461ED2C3C}" type="slidenum">
               <a:rPr lang="pt-BR" smtClean="0"/>
-              <a:t>‹nº›</a:t>
+              <a:t>‹#›</a:t>
             </a:fld>
             <a:endParaRPr lang="pt-BR"/>
           </a:p>
@@ -1852,7 +1855,7 @@
           <a:p>
             <a:fld id="{B3964332-B4AD-4F85-8D69-4802F57C45BC}" type="datetime1">
               <a:rPr lang="pt-BR" smtClean="0"/>
-              <a:t>08/11/2013</a:t>
+              <a:t>09/11/2013</a:t>
             </a:fld>
             <a:endParaRPr lang="pt-BR"/>
           </a:p>
@@ -1894,7 +1897,7 @@
           <a:p>
             <a:fld id="{B2372444-1707-4BD8-BE0A-F9F461ED2C3C}" type="slidenum">
               <a:rPr lang="pt-BR" smtClean="0"/>
-              <a:t>‹nº›</a:t>
+              <a:t>‹#›</a:t>
             </a:fld>
             <a:endParaRPr lang="pt-BR"/>
           </a:p>
@@ -2475,7 +2478,7 @@
           <a:p>
             <a:fld id="{69AE6EBF-C818-4C44-849D-CA338826C5A6}" type="datetime1">
               <a:rPr lang="pt-BR" smtClean="0"/>
-              <a:t>08/11/2013</a:t>
+              <a:t>09/11/2013</a:t>
             </a:fld>
             <a:endParaRPr lang="pt-BR"/>
           </a:p>
@@ -2517,7 +2520,7 @@
           <a:p>
             <a:fld id="{B2372444-1707-4BD8-BE0A-F9F461ED2C3C}" type="slidenum">
               <a:rPr lang="pt-BR" smtClean="0"/>
-              <a:t>‹nº›</a:t>
+              <a:t>‹#›</a:t>
             </a:fld>
             <a:endParaRPr lang="pt-BR"/>
           </a:p>
@@ -3335,7 +3338,7 @@
           <a:p>
             <a:fld id="{BB9772D4-D2AD-4A47-91A1-21A4123C2DD7}" type="datetime1">
               <a:rPr lang="pt-BR" smtClean="0"/>
-              <a:t>08/11/2013</a:t>
+              <a:t>09/11/2013</a:t>
             </a:fld>
             <a:endParaRPr lang="pt-BR"/>
           </a:p>
@@ -3377,7 +3380,7 @@
           <a:p>
             <a:fld id="{B2372444-1707-4BD8-BE0A-F9F461ED2C3C}" type="slidenum">
               <a:rPr lang="pt-BR" smtClean="0"/>
-              <a:t>‹nº›</a:t>
+              <a:t>‹#›</a:t>
             </a:fld>
             <a:endParaRPr lang="pt-BR"/>
           </a:p>
@@ -3505,7 +3508,7 @@
           <a:p>
             <a:fld id="{C20E874A-693A-4E48-A655-CD7705B8EAEB}" type="datetime1">
               <a:rPr lang="pt-BR" smtClean="0"/>
-              <a:t>08/11/2013</a:t>
+              <a:t>09/11/2013</a:t>
             </a:fld>
             <a:endParaRPr lang="pt-BR"/>
           </a:p>
@@ -3547,7 +3550,7 @@
           <a:p>
             <a:fld id="{B2372444-1707-4BD8-BE0A-F9F461ED2C3C}" type="slidenum">
               <a:rPr lang="pt-BR" smtClean="0"/>
-              <a:t>‹nº›</a:t>
+              <a:t>‹#›</a:t>
             </a:fld>
             <a:endParaRPr lang="pt-BR"/>
           </a:p>
@@ -3685,7 +3688,7 @@
           <a:p>
             <a:fld id="{BBF83567-3533-42C6-90EB-AC26D68E0D24}" type="datetime1">
               <a:rPr lang="pt-BR" smtClean="0"/>
-              <a:t>08/11/2013</a:t>
+              <a:t>09/11/2013</a:t>
             </a:fld>
             <a:endParaRPr lang="pt-BR"/>
           </a:p>
@@ -3727,7 +3730,7 @@
           <a:p>
             <a:fld id="{B2372444-1707-4BD8-BE0A-F9F461ED2C3C}" type="slidenum">
               <a:rPr lang="pt-BR" smtClean="0"/>
-              <a:t>‹nº›</a:t>
+              <a:t>‹#›</a:t>
             </a:fld>
             <a:endParaRPr lang="pt-BR"/>
           </a:p>
@@ -3855,7 +3858,7 @@
           <a:p>
             <a:fld id="{F78829D3-D87A-4B4E-AC14-01FF71B3A7DA}" type="datetime1">
               <a:rPr lang="pt-BR" smtClean="0"/>
-              <a:t>08/11/2013</a:t>
+              <a:t>09/11/2013</a:t>
             </a:fld>
             <a:endParaRPr lang="pt-BR"/>
           </a:p>
@@ -3897,7 +3900,7 @@
           <a:p>
             <a:fld id="{B2372444-1707-4BD8-BE0A-F9F461ED2C3C}" type="slidenum">
               <a:rPr lang="pt-BR" smtClean="0"/>
-              <a:t>‹nº›</a:t>
+              <a:t>‹#›</a:t>
             </a:fld>
             <a:endParaRPr lang="pt-BR"/>
           </a:p>
@@ -4102,7 +4105,7 @@
           <a:p>
             <a:fld id="{080AE73B-3A2D-4149-B678-02EFD1EF2FEE}" type="datetime1">
               <a:rPr lang="pt-BR" smtClean="0"/>
-              <a:t>08/11/2013</a:t>
+              <a:t>09/11/2013</a:t>
             </a:fld>
             <a:endParaRPr lang="pt-BR"/>
           </a:p>
@@ -4144,7 +4147,7 @@
           <a:p>
             <a:fld id="{B2372444-1707-4BD8-BE0A-F9F461ED2C3C}" type="slidenum">
               <a:rPr lang="pt-BR" smtClean="0"/>
-              <a:t>‹nº›</a:t>
+              <a:t>‹#›</a:t>
             </a:fld>
             <a:endParaRPr lang="pt-BR"/>
           </a:p>
@@ -4394,7 +4397,7 @@
           <a:p>
             <a:fld id="{4B0F639E-84D1-45F0-8ABB-2CAC3569BE6A}" type="datetime1">
               <a:rPr lang="pt-BR" smtClean="0"/>
-              <a:t>08/11/2013</a:t>
+              <a:t>09/11/2013</a:t>
             </a:fld>
             <a:endParaRPr lang="pt-BR"/>
           </a:p>
@@ -4436,7 +4439,7 @@
           <a:p>
             <a:fld id="{B2372444-1707-4BD8-BE0A-F9F461ED2C3C}" type="slidenum">
               <a:rPr lang="pt-BR" smtClean="0"/>
-              <a:t>‹nº›</a:t>
+              <a:t>‹#›</a:t>
             </a:fld>
             <a:endParaRPr lang="pt-BR"/>
           </a:p>
@@ -4838,7 +4841,7 @@
           <a:p>
             <a:fld id="{1B7696E7-0894-4ADA-A91F-C3E2962BE649}" type="datetime1">
               <a:rPr lang="pt-BR" smtClean="0"/>
-              <a:t>08/11/2013</a:t>
+              <a:t>09/11/2013</a:t>
             </a:fld>
             <a:endParaRPr lang="pt-BR"/>
           </a:p>
@@ -4880,7 +4883,7 @@
           <a:p>
             <a:fld id="{B2372444-1707-4BD8-BE0A-F9F461ED2C3C}" type="slidenum">
               <a:rPr lang="pt-BR" smtClean="0"/>
-              <a:t>‹nº›</a:t>
+              <a:t>‹#›</a:t>
             </a:fld>
             <a:endParaRPr lang="pt-BR"/>
           </a:p>
@@ -4956,7 +4959,7 @@
           <a:p>
             <a:fld id="{1D764C14-78A5-4883-8329-B2F4C1B9F66B}" type="datetime1">
               <a:rPr lang="pt-BR" smtClean="0"/>
-              <a:t>08/11/2013</a:t>
+              <a:t>09/11/2013</a:t>
             </a:fld>
             <a:endParaRPr lang="pt-BR"/>
           </a:p>
@@ -4998,7 +5001,7 @@
           <a:p>
             <a:fld id="{B2372444-1707-4BD8-BE0A-F9F461ED2C3C}" type="slidenum">
               <a:rPr lang="pt-BR" smtClean="0"/>
-              <a:t>‹nº›</a:t>
+              <a:t>‹#›</a:t>
             </a:fld>
             <a:endParaRPr lang="pt-BR"/>
           </a:p>
@@ -5051,7 +5054,7 @@
           <a:p>
             <a:fld id="{51F5A4E8-7B3E-4AD0-A9BA-E82FEA173EC8}" type="datetime1">
               <a:rPr lang="pt-BR" smtClean="0"/>
-              <a:t>08/11/2013</a:t>
+              <a:t>09/11/2013</a:t>
             </a:fld>
             <a:endParaRPr lang="pt-BR"/>
           </a:p>
@@ -5093,7 +5096,7 @@
           <a:p>
             <a:fld id="{B2372444-1707-4BD8-BE0A-F9F461ED2C3C}" type="slidenum">
               <a:rPr lang="pt-BR" smtClean="0"/>
-              <a:t>‹nº›</a:t>
+              <a:t>‹#›</a:t>
             </a:fld>
             <a:endParaRPr lang="pt-BR"/>
           </a:p>
@@ -5330,7 +5333,7 @@
           <a:p>
             <a:fld id="{5C74C753-80D9-4368-A37D-925B30C93570}" type="datetime1">
               <a:rPr lang="pt-BR" smtClean="0"/>
-              <a:t>08/11/2013</a:t>
+              <a:t>09/11/2013</a:t>
             </a:fld>
             <a:endParaRPr lang="pt-BR"/>
           </a:p>
@@ -5372,7 +5375,7 @@
           <a:p>
             <a:fld id="{B2372444-1707-4BD8-BE0A-F9F461ED2C3C}" type="slidenum">
               <a:rPr lang="pt-BR" smtClean="0"/>
-              <a:t>‹nº›</a:t>
+              <a:t>‹#›</a:t>
             </a:fld>
             <a:endParaRPr lang="pt-BR"/>
           </a:p>
@@ -5605,7 +5608,7 @@
           <a:p>
             <a:fld id="{8195EF69-5C01-4C9B-BA33-6ECF029A9D4E}" type="datetime1">
               <a:rPr lang="pt-BR" smtClean="0"/>
-              <a:t>08/11/2013</a:t>
+              <a:t>09/11/2013</a:t>
             </a:fld>
             <a:endParaRPr lang="pt-BR"/>
           </a:p>
@@ -5647,7 +5650,7 @@
           <a:p>
             <a:fld id="{B2372444-1707-4BD8-BE0A-F9F461ED2C3C}" type="slidenum">
               <a:rPr lang="pt-BR" smtClean="0"/>
-              <a:t>‹nº›</a:t>
+              <a:t>‹#›</a:t>
             </a:fld>
             <a:endParaRPr lang="pt-BR"/>
           </a:p>
@@ -6034,7 +6037,7 @@
           <a:p>
             <a:fld id="{ECB666DB-724E-4A80-BDAC-E39E54527F02}" type="datetime1">
               <a:rPr lang="pt-BR" smtClean="0"/>
-              <a:t>08/11/2013</a:t>
+              <a:t>09/11/2013</a:t>
             </a:fld>
             <a:endParaRPr lang="pt-BR"/>
           </a:p>
@@ -6113,7 +6116,7 @@
           <a:p>
             <a:fld id="{B2372444-1707-4BD8-BE0A-F9F461ED2C3C}" type="slidenum">
               <a:rPr lang="pt-BR" smtClean="0"/>
-              <a:t>‹nº›</a:t>
+              <a:t>‹#›</a:t>
             </a:fld>
             <a:endParaRPr lang="pt-BR"/>
           </a:p>
@@ -6590,7 +6593,6 @@
               <a:rPr lang="pt-BR" sz="5400" dirty="0"/>
               <a:t>ativos</a:t>
             </a:r>
-            <a:endParaRPr lang="pt-BR" sz="5400" dirty="0"/>
           </a:p>
         </p:txBody>
       </p:sp>
@@ -6639,7 +6641,7 @@
             </a:r>
             <a:r>
               <a:rPr lang="en-US" dirty="0" err="1" smtClean="0"/>
-              <a:t>Raganati</a:t>
+              <a:t>REganati</a:t>
             </a:r>
             <a:r>
               <a:rPr lang="en-US" dirty="0" smtClean="0"/>
@@ -8495,7 +8497,15 @@
           <a:bodyPr/>
           <a:lstStyle/>
           <a:p>
-            <a:endParaRPr lang="pt-BR"/>
+            <a:r>
+              <a:rPr lang="pt-BR" dirty="0" smtClean="0"/>
+              <a:t>Smart Audio </a:t>
+            </a:r>
+            <a:r>
+              <a:rPr lang="pt-BR" smtClean="0"/>
+              <a:t>City Guide</a:t>
+            </a:r>
+            <a:endParaRPr lang="pt-BR" dirty="0" smtClean="0"/>
           </a:p>
         </p:txBody>
       </p:sp>

</xml_diff>

<commit_message>
Power Point Adicionando algumas coisas
</commit_message>
<xml_diff>
--- a/apresentacao.pptx
+++ b/apresentacao.pptx
@@ -5,24 +5,29 @@
     <p:sldMasterId id="2147483866" r:id="rId1"/>
   </p:sldMasterIdLst>
   <p:notesMasterIdLst>
-    <p:notesMasterId r:id="rId17"/>
+    <p:notesMasterId r:id="rId22"/>
   </p:notesMasterIdLst>
   <p:sldIdLst>
     <p:sldId id="256" r:id="rId2"/>
     <p:sldId id="257" r:id="rId3"/>
-    <p:sldId id="263" r:id="rId4"/>
-    <p:sldId id="259" r:id="rId5"/>
-    <p:sldId id="270" r:id="rId6"/>
-    <p:sldId id="271" r:id="rId7"/>
-    <p:sldId id="260" r:id="rId8"/>
-    <p:sldId id="261" r:id="rId9"/>
-    <p:sldId id="262" r:id="rId10"/>
-    <p:sldId id="264" r:id="rId11"/>
-    <p:sldId id="265" r:id="rId12"/>
-    <p:sldId id="266" r:id="rId13"/>
-    <p:sldId id="267" r:id="rId14"/>
-    <p:sldId id="268" r:id="rId15"/>
-    <p:sldId id="269" r:id="rId16"/>
+    <p:sldId id="272" r:id="rId4"/>
+    <p:sldId id="263" r:id="rId5"/>
+    <p:sldId id="259" r:id="rId6"/>
+    <p:sldId id="270" r:id="rId7"/>
+    <p:sldId id="271" r:id="rId8"/>
+    <p:sldId id="260" r:id="rId9"/>
+    <p:sldId id="261" r:id="rId10"/>
+    <p:sldId id="273" r:id="rId11"/>
+    <p:sldId id="274" r:id="rId12"/>
+    <p:sldId id="262" r:id="rId13"/>
+    <p:sldId id="275" r:id="rId14"/>
+    <p:sldId id="276" r:id="rId15"/>
+    <p:sldId id="264" r:id="rId16"/>
+    <p:sldId id="265" r:id="rId17"/>
+    <p:sldId id="266" r:id="rId18"/>
+    <p:sldId id="267" r:id="rId19"/>
+    <p:sldId id="268" r:id="rId20"/>
+    <p:sldId id="269" r:id="rId21"/>
   </p:sldIdLst>
   <p:sldSz cx="12192000" cy="6858000"/>
   <p:notesSz cx="6858000" cy="9144000"/>
@@ -128,13 +133,18 @@
           <p14:sldIdLst>
             <p14:sldId id="256"/>
             <p14:sldId id="257"/>
+            <p14:sldId id="272"/>
             <p14:sldId id="263"/>
             <p14:sldId id="259"/>
             <p14:sldId id="270"/>
             <p14:sldId id="271"/>
             <p14:sldId id="260"/>
             <p14:sldId id="261"/>
+            <p14:sldId id="273"/>
+            <p14:sldId id="274"/>
             <p14:sldId id="262"/>
+            <p14:sldId id="275"/>
+            <p14:sldId id="276"/>
             <p14:sldId id="264"/>
             <p14:sldId id="265"/>
             <p14:sldId id="266"/>
@@ -234,7 +244,7 @@
           <a:p>
             <a:fld id="{6BB15B15-C25E-44A5-AA8B-982210CB7094}" type="datetimeFigureOut">
               <a:rPr lang="pt-BR" smtClean="0"/>
-              <a:t>09/11/2013</a:t>
+              <a:t>11/11/2013</a:t>
             </a:fld>
             <a:endParaRPr lang="pt-BR"/>
           </a:p>
@@ -772,7 +782,7 @@
           <a:p>
             <a:fld id="{DBF08CCE-BA63-43DD-9A8F-D3A34D1C207B}" type="datetime1">
               <a:rPr lang="pt-BR" smtClean="0"/>
-              <a:t>09/11/2013</a:t>
+              <a:t>11/11/2013</a:t>
             </a:fld>
             <a:endParaRPr lang="pt-BR"/>
           </a:p>
@@ -1047,7 +1057,7 @@
           <a:p>
             <a:fld id="{06024363-0470-4741-AE36-6E80383105AB}" type="datetime1">
               <a:rPr lang="pt-BR" smtClean="0"/>
-              <a:t>09/11/2013</a:t>
+              <a:t>11/11/2013</a:t>
             </a:fld>
             <a:endParaRPr lang="pt-BR"/>
           </a:p>
@@ -1241,7 +1251,7 @@
           <a:p>
             <a:fld id="{77A60394-A8B1-4D3A-95EE-445A3470BB01}" type="datetime1">
               <a:rPr lang="pt-BR" smtClean="0"/>
-              <a:t>09/11/2013</a:t>
+              <a:t>11/11/2013</a:t>
             </a:fld>
             <a:endParaRPr lang="pt-BR"/>
           </a:p>
@@ -1514,7 +1524,7 @@
           <a:p>
             <a:fld id="{B4062BEB-6908-4461-BBFD-3C8D133B45DE}" type="datetime1">
               <a:rPr lang="pt-BR" smtClean="0"/>
-              <a:t>09/11/2013</a:t>
+              <a:t>11/11/2013</a:t>
             </a:fld>
             <a:endParaRPr lang="pt-BR"/>
           </a:p>
@@ -1855,7 +1865,7 @@
           <a:p>
             <a:fld id="{B3964332-B4AD-4F85-8D69-4802F57C45BC}" type="datetime1">
               <a:rPr lang="pt-BR" smtClean="0"/>
-              <a:t>09/11/2013</a:t>
+              <a:t>11/11/2013</a:t>
             </a:fld>
             <a:endParaRPr lang="pt-BR"/>
           </a:p>
@@ -2478,7 +2488,7 @@
           <a:p>
             <a:fld id="{69AE6EBF-C818-4C44-849D-CA338826C5A6}" type="datetime1">
               <a:rPr lang="pt-BR" smtClean="0"/>
-              <a:t>09/11/2013</a:t>
+              <a:t>11/11/2013</a:t>
             </a:fld>
             <a:endParaRPr lang="pt-BR"/>
           </a:p>
@@ -3338,7 +3348,7 @@
           <a:p>
             <a:fld id="{BB9772D4-D2AD-4A47-91A1-21A4123C2DD7}" type="datetime1">
               <a:rPr lang="pt-BR" smtClean="0"/>
-              <a:t>09/11/2013</a:t>
+              <a:t>11/11/2013</a:t>
             </a:fld>
             <a:endParaRPr lang="pt-BR"/>
           </a:p>
@@ -3508,7 +3518,7 @@
           <a:p>
             <a:fld id="{C20E874A-693A-4E48-A655-CD7705B8EAEB}" type="datetime1">
               <a:rPr lang="pt-BR" smtClean="0"/>
-              <a:t>09/11/2013</a:t>
+              <a:t>11/11/2013</a:t>
             </a:fld>
             <a:endParaRPr lang="pt-BR"/>
           </a:p>
@@ -3688,7 +3698,7 @@
           <a:p>
             <a:fld id="{BBF83567-3533-42C6-90EB-AC26D68E0D24}" type="datetime1">
               <a:rPr lang="pt-BR" smtClean="0"/>
-              <a:t>09/11/2013</a:t>
+              <a:t>11/11/2013</a:t>
             </a:fld>
             <a:endParaRPr lang="pt-BR"/>
           </a:p>
@@ -3858,7 +3868,7 @@
           <a:p>
             <a:fld id="{F78829D3-D87A-4B4E-AC14-01FF71B3A7DA}" type="datetime1">
               <a:rPr lang="pt-BR" smtClean="0"/>
-              <a:t>09/11/2013</a:t>
+              <a:t>11/11/2013</a:t>
             </a:fld>
             <a:endParaRPr lang="pt-BR"/>
           </a:p>
@@ -4105,7 +4115,7 @@
           <a:p>
             <a:fld id="{080AE73B-3A2D-4149-B678-02EFD1EF2FEE}" type="datetime1">
               <a:rPr lang="pt-BR" smtClean="0"/>
-              <a:t>09/11/2013</a:t>
+              <a:t>11/11/2013</a:t>
             </a:fld>
             <a:endParaRPr lang="pt-BR"/>
           </a:p>
@@ -4397,7 +4407,7 @@
           <a:p>
             <a:fld id="{4B0F639E-84D1-45F0-8ABB-2CAC3569BE6A}" type="datetime1">
               <a:rPr lang="pt-BR" smtClean="0"/>
-              <a:t>09/11/2013</a:t>
+              <a:t>11/11/2013</a:t>
             </a:fld>
             <a:endParaRPr lang="pt-BR"/>
           </a:p>
@@ -4841,7 +4851,7 @@
           <a:p>
             <a:fld id="{1B7696E7-0894-4ADA-A91F-C3E2962BE649}" type="datetime1">
               <a:rPr lang="pt-BR" smtClean="0"/>
-              <a:t>09/11/2013</a:t>
+              <a:t>11/11/2013</a:t>
             </a:fld>
             <a:endParaRPr lang="pt-BR"/>
           </a:p>
@@ -4959,7 +4969,7 @@
           <a:p>
             <a:fld id="{1D764C14-78A5-4883-8329-B2F4C1B9F66B}" type="datetime1">
               <a:rPr lang="pt-BR" smtClean="0"/>
-              <a:t>09/11/2013</a:t>
+              <a:t>11/11/2013</a:t>
             </a:fld>
             <a:endParaRPr lang="pt-BR"/>
           </a:p>
@@ -5054,7 +5064,7 @@
           <a:p>
             <a:fld id="{51F5A4E8-7B3E-4AD0-A9BA-E82FEA173EC8}" type="datetime1">
               <a:rPr lang="pt-BR" smtClean="0"/>
-              <a:t>09/11/2013</a:t>
+              <a:t>11/11/2013</a:t>
             </a:fld>
             <a:endParaRPr lang="pt-BR"/>
           </a:p>
@@ -5333,7 +5343,7 @@
           <a:p>
             <a:fld id="{5C74C753-80D9-4368-A37D-925B30C93570}" type="datetime1">
               <a:rPr lang="pt-BR" smtClean="0"/>
-              <a:t>09/11/2013</a:t>
+              <a:t>11/11/2013</a:t>
             </a:fld>
             <a:endParaRPr lang="pt-BR"/>
           </a:p>
@@ -5608,7 +5618,7 @@
           <a:p>
             <a:fld id="{8195EF69-5C01-4C9B-BA33-6ECF029A9D4E}" type="datetime1">
               <a:rPr lang="pt-BR" smtClean="0"/>
-              <a:t>09/11/2013</a:t>
+              <a:t>11/11/2013</a:t>
             </a:fld>
             <a:endParaRPr lang="pt-BR"/>
           </a:p>
@@ -6037,7 +6047,7 @@
           <a:p>
             <a:fld id="{ECB666DB-724E-4A80-BDAC-E39E54527F02}" type="datetime1">
               <a:rPr lang="pt-BR" smtClean="0"/>
-              <a:t>09/11/2013</a:t>
+              <a:t>11/11/2013</a:t>
             </a:fld>
             <a:endParaRPr lang="pt-BR"/>
           </a:p>
@@ -6720,7 +6730,7 @@
       </p:grpSpPr>
       <p:sp>
         <p:nvSpPr>
-          <p:cNvPr id="2" name="Título 1"/>
+          <p:cNvPr id="2" name="Title 1"/>
           <p:cNvSpPr>
             <a:spLocks noGrp="1"/>
           </p:cNvSpPr>
@@ -6734,8 +6744,8 @@
           <a:lstStyle/>
           <a:p>
             <a:r>
-              <a:rPr lang="en-US" dirty="0" err="1" smtClean="0"/>
-              <a:t>Cenário</a:t>
+              <a:rPr lang="pt-BR" sz="4400" dirty="0"/>
+              <a:t>Características técnicas: MS SQL-Server </a:t>
             </a:r>
             <a:endParaRPr lang="pt-BR" dirty="0"/>
           </a:p>
@@ -6743,7 +6753,7 @@
       </p:sp>
       <p:sp>
         <p:nvSpPr>
-          <p:cNvPr id="3" name="Espaço Reservado para Conteúdo 2"/>
+          <p:cNvPr id="3" name="Content Placeholder 2"/>
           <p:cNvSpPr>
             <a:spLocks noGrp="1"/>
           </p:cNvSpPr>
@@ -6753,16 +6763,88 @@
         </p:nvSpPr>
         <p:spPr/>
         <p:txBody>
-          <a:bodyPr/>
-          <a:lstStyle/>
-          <a:p>
-            <a:endParaRPr lang="pt-BR"/>
-          </a:p>
-        </p:txBody>
-      </p:sp>
-      <p:sp>
-        <p:nvSpPr>
-          <p:cNvPr id="4" name="Espaço Reservado para Número de Slide 3"/>
+          <a:bodyPr>
+            <a:normAutofit fontScale="92500" lnSpcReduction="20000"/>
+          </a:bodyPr>
+          <a:lstStyle/>
+          <a:p>
+            <a:r>
+              <a:rPr lang="pt-BR" dirty="0"/>
+              <a:t>Funciona no sistema operacional </a:t>
+            </a:r>
+            <a:r>
+              <a:rPr lang="pt-BR" dirty="0" smtClean="0"/>
+              <a:t>Windows</a:t>
+            </a:r>
+          </a:p>
+          <a:p>
+            <a:endParaRPr lang="pt-BR" dirty="0"/>
+          </a:p>
+          <a:p>
+            <a:r>
+              <a:rPr lang="pt-BR" dirty="0"/>
+              <a:t>Suporte a </a:t>
+            </a:r>
+            <a:r>
+              <a:rPr lang="pt-BR" dirty="0" smtClean="0"/>
+              <a:t>multi-threads</a:t>
+            </a:r>
+          </a:p>
+          <a:p>
+            <a:endParaRPr lang="pt-BR" dirty="0"/>
+          </a:p>
+          <a:p>
+            <a:r>
+              <a:rPr lang="pt-BR" dirty="0"/>
+              <a:t>Suporte nativo ao </a:t>
+            </a:r>
+            <a:r>
+              <a:rPr lang="pt-BR" dirty="0" smtClean="0"/>
+              <a:t>XML</a:t>
+            </a:r>
+          </a:p>
+          <a:p>
+            <a:endParaRPr lang="pt-BR" dirty="0"/>
+          </a:p>
+          <a:p>
+            <a:r>
+              <a:rPr lang="pt-BR" dirty="0"/>
+              <a:t>Suporte a Data </a:t>
+            </a:r>
+            <a:r>
+              <a:rPr lang="pt-BR" dirty="0" smtClean="0"/>
+              <a:t>Warehouse</a:t>
+            </a:r>
+            <a:endParaRPr lang="pt-BR" dirty="0"/>
+          </a:p>
+          <a:p>
+            <a:endParaRPr lang="pt-BR" dirty="0" smtClean="0"/>
+          </a:p>
+          <a:p>
+            <a:r>
+              <a:rPr lang="pt-BR" dirty="0"/>
+              <a:t>Triggers Recursivas</a:t>
+            </a:r>
+            <a:r>
+              <a:rPr lang="pt-BR" dirty="0" smtClean="0"/>
+              <a:t>.</a:t>
+            </a:r>
+          </a:p>
+          <a:p>
+            <a:endParaRPr lang="pt-BR" dirty="0"/>
+          </a:p>
+          <a:p>
+            <a:r>
+              <a:rPr lang="pt-BR" dirty="0"/>
+              <a:t>Suporte a cryptografia</a:t>
+            </a:r>
+            <a:endParaRPr lang="pt-BR" dirty="0"/>
+          </a:p>
+        </p:txBody>
+      </p:sp>
+      <p:sp>
+        <p:nvSpPr>
+          <p:cNvPr id="4" name="Slide Number Placeholder 3"/>
           <p:cNvSpPr>
             <a:spLocks noGrp="1"/>
           </p:cNvSpPr>
@@ -6786,7 +6868,7 @@
     </p:spTree>
     <p:extLst>
       <p:ext uri="{BB962C8B-B14F-4D97-AF65-F5344CB8AC3E}">
-        <p14:creationId xmlns:p14="http://schemas.microsoft.com/office/powerpoint/2010/main" val="1936479153"/>
+        <p14:creationId xmlns:p14="http://schemas.microsoft.com/office/powerpoint/2010/main" val="2508516361"/>
       </p:ext>
     </p:extLst>
   </p:cSld>
@@ -6825,7 +6907,7 @@
       </p:grpSpPr>
       <p:sp>
         <p:nvSpPr>
-          <p:cNvPr id="2" name="Título 1"/>
+          <p:cNvPr id="2" name="Title 1"/>
           <p:cNvSpPr>
             <a:spLocks noGrp="1"/>
           </p:cNvSpPr>
@@ -6839,12 +6921,8 @@
           <a:lstStyle/>
           <a:p>
             <a:r>
-              <a:rPr lang="en-US" dirty="0" err="1" smtClean="0"/>
-              <a:t>Descrição</a:t>
-            </a:r>
-            <a:r>
-              <a:rPr lang="en-US" dirty="0" smtClean="0"/>
-              <a:t> dos testes</a:t>
+              <a:rPr lang="pt-BR" sz="4000" dirty="0"/>
+              <a:t>Características técnicas: MS SQL-Server </a:t>
             </a:r>
             <a:endParaRPr lang="pt-BR" dirty="0"/>
           </a:p>
@@ -6852,7 +6930,7 @@
       </p:sp>
       <p:sp>
         <p:nvSpPr>
-          <p:cNvPr id="3" name="Espaço Reservado para Conteúdo 2"/>
+          <p:cNvPr id="3" name="Content Placeholder 2"/>
           <p:cNvSpPr>
             <a:spLocks noGrp="1"/>
           </p:cNvSpPr>
@@ -6865,13 +6943,84 @@
           <a:bodyPr/>
           <a:lstStyle/>
           <a:p>
-            <a:endParaRPr lang="pt-BR"/>
-          </a:p>
-        </p:txBody>
-      </p:sp>
-      <p:sp>
-        <p:nvSpPr>
-          <p:cNvPr id="4" name="Espaço Reservado para Número de Slide 3"/>
+            <a:r>
+              <a:rPr lang="pt-BR" dirty="0"/>
+              <a:t>Há dois tipos de consideração em SQL Server, AFTER </a:t>
+            </a:r>
+            <a:r>
+              <a:rPr lang="pt-BR" dirty="0" smtClean="0"/>
+              <a:t>e INSTEAD </a:t>
+            </a:r>
+            <a:r>
+              <a:rPr lang="pt-BR" dirty="0"/>
+              <a:t>OF. </a:t>
+            </a:r>
+            <a:endParaRPr lang="pt-BR" dirty="0"/>
+          </a:p>
+          <a:p>
+            <a:endParaRPr lang="pt-BR" dirty="0" smtClean="0"/>
+          </a:p>
+          <a:p>
+            <a:r>
+              <a:rPr lang="pt-BR" dirty="0" smtClean="0"/>
+              <a:t>AFTER </a:t>
+            </a:r>
+            <a:r>
+              <a:rPr lang="pt-BR" dirty="0"/>
+              <a:t>não é executado até que as </a:t>
+            </a:r>
+            <a:r>
+              <a:rPr lang="pt-BR" dirty="0" smtClean="0"/>
+              <a:t>mudanças que </a:t>
+            </a:r>
+            <a:r>
+              <a:rPr lang="pt-BR" dirty="0"/>
+              <a:t>o dispararam tenham feitos suas modificações nos </a:t>
+            </a:r>
+            <a:r>
+              <a:rPr lang="pt-BR" dirty="0" smtClean="0"/>
+              <a:t>dados</a:t>
+            </a:r>
+          </a:p>
+          <a:p>
+            <a:endParaRPr lang="pt-BR" dirty="0"/>
+          </a:p>
+          <a:p>
+            <a:r>
+              <a:rPr lang="pt-BR" dirty="0" smtClean="0"/>
+              <a:t>INSTEAD </a:t>
+            </a:r>
+            <a:r>
+              <a:rPr lang="pt-BR" dirty="0"/>
+              <a:t>OF é executado após a criação das </a:t>
+            </a:r>
+            <a:r>
+              <a:rPr lang="pt-BR" dirty="0" smtClean="0"/>
+              <a:t>tabelas inserted </a:t>
+            </a:r>
+            <a:r>
+              <a:rPr lang="pt-BR" dirty="0"/>
+              <a:t>(NEW) e deleted (OLD) forem criadas, mas antes </a:t>
+            </a:r>
+            <a:r>
+              <a:rPr lang="pt-BR" dirty="0" smtClean="0"/>
+              <a:t>de outras </a:t>
+            </a:r>
+            <a:r>
+              <a:rPr lang="pt-BR" dirty="0"/>
+              <a:t>ações</a:t>
+            </a:r>
+            <a:r>
+              <a:rPr lang="pt-BR" dirty="0" smtClean="0"/>
+              <a:t>.</a:t>
+            </a:r>
+            <a:endParaRPr lang="pt-BR" dirty="0"/>
+          </a:p>
+        </p:txBody>
+      </p:sp>
+      <p:sp>
+        <p:nvSpPr>
+          <p:cNvPr id="4" name="Slide Number Placeholder 3"/>
           <p:cNvSpPr>
             <a:spLocks noGrp="1"/>
           </p:cNvSpPr>
@@ -6895,7 +7044,7 @@
     </p:spTree>
     <p:extLst>
       <p:ext uri="{BB962C8B-B14F-4D97-AF65-F5344CB8AC3E}">
-        <p14:creationId xmlns:p14="http://schemas.microsoft.com/office/powerpoint/2010/main" val="2450203372"/>
+        <p14:creationId xmlns:p14="http://schemas.microsoft.com/office/powerpoint/2010/main" val="2503338333"/>
       </p:ext>
     </p:extLst>
   </p:cSld>
@@ -6948,33 +7097,74 @@
           <a:lstStyle/>
           <a:p>
             <a:r>
-              <a:rPr lang="en-US" dirty="0" err="1" smtClean="0"/>
-              <a:t>Modelagem</a:t>
-            </a:r>
-            <a:r>
-              <a:rPr lang="en-US" dirty="0" smtClean="0"/>
-              <a:t>: MySQL</a:t>
-            </a:r>
+              <a:rPr lang="pt-BR" sz="3600" dirty="0"/>
+              <a:t>Características técnicas: </a:t>
+            </a:r>
+            <a:r>
+              <a:rPr lang="pt-BR" sz="3600" dirty="0" smtClean="0"/>
+              <a:t>MySQL</a:t>
+            </a:r>
+            <a:endParaRPr lang="pt-BR" sz="3600" dirty="0"/>
+          </a:p>
+        </p:txBody>
+      </p:sp>
+      <p:sp>
+        <p:nvSpPr>
+          <p:cNvPr id="3" name="Espaço Reservado para Conteúdo 2"/>
+          <p:cNvSpPr>
+            <a:spLocks noGrp="1"/>
+          </p:cNvSpPr>
+          <p:nvPr>
+            <p:ph idx="1"/>
+          </p:nvPr>
+        </p:nvSpPr>
+        <p:spPr/>
+        <p:txBody>
+          <a:bodyPr/>
+          <a:lstStyle/>
+          <a:p>
+            <a:r>
+              <a:rPr lang="pt-BR" dirty="0"/>
+              <a:t>MySQL é o mais popular sistema </a:t>
+            </a:r>
+            <a:r>
+              <a:rPr lang="pt-BR" dirty="0" smtClean="0"/>
+              <a:t>de gerenciamento </a:t>
+            </a:r>
+            <a:r>
+              <a:rPr lang="pt-BR" dirty="0"/>
+              <a:t>de banco de dados SQL Open </a:t>
+            </a:r>
+            <a:r>
+              <a:rPr lang="pt-BR" dirty="0" smtClean="0"/>
+              <a:t>Source</a:t>
+            </a:r>
+          </a:p>
+          <a:p>
             <a:endParaRPr lang="pt-BR" dirty="0"/>
           </a:p>
-        </p:txBody>
-      </p:sp>
-      <p:sp>
-        <p:nvSpPr>
-          <p:cNvPr id="3" name="Espaço Reservado para Conteúdo 2"/>
-          <p:cNvSpPr>
-            <a:spLocks noGrp="1"/>
-          </p:cNvSpPr>
-          <p:nvPr>
-            <p:ph idx="1"/>
-          </p:nvPr>
-        </p:nvSpPr>
-        <p:spPr/>
-        <p:txBody>
-          <a:bodyPr/>
-          <a:lstStyle/>
-          <a:p>
-            <a:endParaRPr lang="pt-BR"/>
+          <a:p>
+            <a:r>
+              <a:rPr lang="pt-BR" dirty="0"/>
+              <a:t>D</a:t>
+            </a:r>
+            <a:r>
+              <a:rPr lang="pt-BR" dirty="0" smtClean="0"/>
+              <a:t>esenvolvido</a:t>
+            </a:r>
+            <a:r>
+              <a:rPr lang="pt-BR" dirty="0"/>
+              <a:t>, distribuído e tem suporte </a:t>
+            </a:r>
+            <a:r>
+              <a:rPr lang="pt-BR" dirty="0" smtClean="0"/>
+              <a:t>pela empresa MySQL </a:t>
+            </a:r>
+            <a:r>
+              <a:rPr lang="pt-BR" dirty="0"/>
+              <a:t>AB.</a:t>
+            </a:r>
+            <a:endParaRPr lang="pt-BR" dirty="0"/>
           </a:p>
         </p:txBody>
       </p:sp>
@@ -7004,7 +7194,7 @@
     </p:spTree>
     <p:extLst>
       <p:ext uri="{BB962C8B-B14F-4D97-AF65-F5344CB8AC3E}">
-        <p14:creationId xmlns:p14="http://schemas.microsoft.com/office/powerpoint/2010/main" val="399667511"/>
+        <p14:creationId xmlns:p14="http://schemas.microsoft.com/office/powerpoint/2010/main" val="4206918975"/>
       </p:ext>
     </p:extLst>
   </p:cSld>
@@ -7043,7 +7233,7 @@
       </p:grpSpPr>
       <p:sp>
         <p:nvSpPr>
-          <p:cNvPr id="2" name="Título 1"/>
+          <p:cNvPr id="2" name="Title 1"/>
           <p:cNvSpPr>
             <a:spLocks noGrp="1"/>
           </p:cNvSpPr>
@@ -7057,16 +7247,8 @@
           <a:lstStyle/>
           <a:p>
             <a:r>
-              <a:rPr lang="en-US" dirty="0" err="1"/>
-              <a:t>Modelagem</a:t>
-            </a:r>
-            <a:r>
-              <a:rPr lang="en-US" dirty="0"/>
-              <a:t>: </a:t>
-            </a:r>
-            <a:r>
-              <a:rPr lang="en-US" dirty="0" smtClean="0"/>
-              <a:t>MS SQL-Server</a:t>
+              <a:rPr lang="pt-BR" sz="4400" dirty="0"/>
+              <a:t>Características técnicas: MySQL</a:t>
             </a:r>
             <a:endParaRPr lang="pt-BR" dirty="0"/>
           </a:p>
@@ -7074,7 +7256,7 @@
       </p:sp>
       <p:sp>
         <p:nvSpPr>
-          <p:cNvPr id="3" name="Espaço Reservado para Conteúdo 2"/>
+          <p:cNvPr id="3" name="Content Placeholder 2"/>
           <p:cNvSpPr>
             <a:spLocks noGrp="1"/>
           </p:cNvSpPr>
@@ -7087,13 +7269,77 @@
           <a:bodyPr/>
           <a:lstStyle/>
           <a:p>
-            <a:endParaRPr lang="pt-BR"/>
-          </a:p>
-        </p:txBody>
-      </p:sp>
-      <p:sp>
-        <p:nvSpPr>
-          <p:cNvPr id="4" name="Espaço Reservado para Número de Slide 3"/>
+            <a:r>
+              <a:rPr lang="pt-BR" dirty="0"/>
+              <a:t>Escrito em C e C</a:t>
+            </a:r>
+            <a:r>
+              <a:rPr lang="pt-BR" dirty="0" smtClean="0"/>
+              <a:t>++.</a:t>
+            </a:r>
+          </a:p>
+          <a:p>
+            <a:endParaRPr lang="pt-BR" dirty="0" smtClean="0"/>
+          </a:p>
+          <a:p>
+            <a:r>
+              <a:rPr lang="pt-BR" dirty="0"/>
+              <a:t>Funciona em diversas plataformas, como </a:t>
+            </a:r>
+            <a:r>
+              <a:rPr lang="pt-BR" dirty="0" smtClean="0"/>
+              <a:t>Windows, Linux </a:t>
+            </a:r>
+            <a:r>
+              <a:rPr lang="pt-BR" dirty="0"/>
+              <a:t>2.0+, OpenBSD, FreeBSD, SunOS 4.x e outros</a:t>
+            </a:r>
+            <a:endParaRPr lang="pt-BR" dirty="0" smtClean="0"/>
+          </a:p>
+          <a:p>
+            <a:endParaRPr lang="pt-BR" dirty="0"/>
+          </a:p>
+          <a:p>
+            <a:r>
+              <a:rPr lang="pt-BR" dirty="0"/>
+              <a:t>Completo suporte a operadores e funções da </a:t>
+            </a:r>
+            <a:r>
+              <a:rPr lang="pt-BR" dirty="0" smtClean="0"/>
+              <a:t>linguagem SQL </a:t>
+            </a:r>
+            <a:r>
+              <a:rPr lang="pt-BR" dirty="0"/>
+              <a:t>para consultas e </a:t>
+            </a:r>
+            <a:r>
+              <a:rPr lang="pt-BR" dirty="0" smtClean="0"/>
+              <a:t>funções</a:t>
+            </a:r>
+          </a:p>
+          <a:p>
+            <a:endParaRPr lang="pt-BR" dirty="0"/>
+          </a:p>
+          <a:p>
+            <a:r>
+              <a:rPr lang="pt-BR" dirty="0"/>
+              <a:t>Suporte total para vários conjuntos de caracteres, </a:t>
+            </a:r>
+            <a:r>
+              <a:rPr lang="pt-BR" dirty="0" smtClean="0"/>
+              <a:t>que incluem </a:t>
+            </a:r>
+            <a:r>
+              <a:rPr lang="pt-BR" dirty="0"/>
+              <a:t>ISO-8859-1 (Latin1), big5, ujis e mais.</a:t>
+            </a:r>
+            <a:endParaRPr lang="pt-BR" dirty="0"/>
+          </a:p>
+        </p:txBody>
+      </p:sp>
+      <p:sp>
+        <p:nvSpPr>
+          <p:cNvPr id="4" name="Slide Number Placeholder 3"/>
           <p:cNvSpPr>
             <a:spLocks noGrp="1"/>
           </p:cNvSpPr>
@@ -7117,7 +7363,7 @@
     </p:spTree>
     <p:extLst>
       <p:ext uri="{BB962C8B-B14F-4D97-AF65-F5344CB8AC3E}">
-        <p14:creationId xmlns:p14="http://schemas.microsoft.com/office/powerpoint/2010/main" val="710916449"/>
+        <p14:creationId xmlns:p14="http://schemas.microsoft.com/office/powerpoint/2010/main" val="265622100"/>
       </p:ext>
     </p:extLst>
   </p:cSld>
@@ -7156,7 +7402,7 @@
       </p:grpSpPr>
       <p:sp>
         <p:nvSpPr>
-          <p:cNvPr id="2" name="Título 1"/>
+          <p:cNvPr id="2" name="Title 1"/>
           <p:cNvSpPr>
             <a:spLocks noGrp="1"/>
           </p:cNvSpPr>
@@ -7170,12 +7416,8 @@
           <a:lstStyle/>
           <a:p>
             <a:r>
-              <a:rPr lang="en-US" dirty="0" err="1" smtClean="0"/>
-              <a:t>Conclusão</a:t>
-            </a:r>
-            <a:r>
-              <a:rPr lang="en-US" dirty="0" smtClean="0"/>
-              <a:t> dos testes</a:t>
+              <a:rPr lang="pt-BR" sz="4000" dirty="0"/>
+              <a:t>Características técnicas: MySQL</a:t>
             </a:r>
             <a:endParaRPr lang="pt-BR" dirty="0"/>
           </a:p>
@@ -7183,7 +7425,7 @@
       </p:sp>
       <p:sp>
         <p:nvSpPr>
-          <p:cNvPr id="3" name="Espaço Reservado para Conteúdo 2"/>
+          <p:cNvPr id="3" name="Content Placeholder 2"/>
           <p:cNvSpPr>
             <a:spLocks noGrp="1"/>
           </p:cNvSpPr>
@@ -7196,13 +7438,82 @@
           <a:bodyPr/>
           <a:lstStyle/>
           <a:p>
-            <a:endParaRPr lang="pt-BR"/>
-          </a:p>
-        </p:txBody>
-      </p:sp>
-      <p:sp>
-        <p:nvSpPr>
-          <p:cNvPr id="4" name="Espaço Reservado para Número de Slide 3"/>
+            <a:r>
+              <a:rPr lang="pt-BR" dirty="0"/>
+              <a:t>A consideração e execução de regras ativas depende do </a:t>
+            </a:r>
+            <a:r>
+              <a:rPr lang="pt-BR" dirty="0" smtClean="0"/>
+              <a:t>tempo de </a:t>
+            </a:r>
+            <a:r>
+              <a:rPr lang="pt-BR" dirty="0"/>
+              <a:t>execução definido para a trigger. </a:t>
+            </a:r>
+            <a:endParaRPr lang="pt-BR" dirty="0" smtClean="0"/>
+          </a:p>
+          <a:p>
+            <a:endParaRPr lang="pt-BR" dirty="0"/>
+          </a:p>
+          <a:p>
+            <a:r>
+              <a:rPr lang="pt-BR" dirty="0" smtClean="0"/>
+              <a:t>BEFORE, </a:t>
+            </a:r>
+            <a:r>
+              <a:rPr lang="pt-BR" dirty="0"/>
+              <a:t>a consideração é feita antes </a:t>
+            </a:r>
+            <a:r>
+              <a:rPr lang="pt-BR" dirty="0" smtClean="0"/>
+              <a:t>da transação.</a:t>
+            </a:r>
+          </a:p>
+          <a:p>
+            <a:endParaRPr lang="pt-BR" dirty="0" smtClean="0"/>
+          </a:p>
+          <a:p>
+            <a:r>
+              <a:rPr lang="pt-BR" dirty="0" smtClean="0"/>
+              <a:t>AFTER, </a:t>
+            </a:r>
+            <a:r>
+              <a:rPr lang="pt-BR" dirty="0"/>
+              <a:t>ela é feita após </a:t>
+            </a:r>
+            <a:r>
+              <a:rPr lang="pt-BR" dirty="0" smtClean="0"/>
+              <a:t>a transação</a:t>
+            </a:r>
+            <a:r>
+              <a:rPr lang="pt-BR" dirty="0"/>
+              <a:t>. </a:t>
+            </a:r>
+            <a:endParaRPr lang="pt-BR" dirty="0" smtClean="0"/>
+          </a:p>
+          <a:p>
+            <a:endParaRPr lang="pt-BR" dirty="0"/>
+          </a:p>
+          <a:p>
+            <a:r>
+              <a:rPr lang="pt-BR" dirty="0" smtClean="0"/>
+              <a:t>A </a:t>
+            </a:r>
+            <a:r>
+              <a:rPr lang="pt-BR" dirty="0"/>
+              <a:t>execução é sempre imediata</a:t>
+            </a:r>
+            <a:r>
+              <a:rPr lang="pt-BR" dirty="0" smtClean="0"/>
+              <a:t>.</a:t>
+            </a:r>
+            <a:endParaRPr lang="pt-BR" dirty="0"/>
+          </a:p>
+        </p:txBody>
+      </p:sp>
+      <p:sp>
+        <p:nvSpPr>
+          <p:cNvPr id="4" name="Slide Number Placeholder 3"/>
           <p:cNvSpPr>
             <a:spLocks noGrp="1"/>
           </p:cNvSpPr>
@@ -7226,7 +7537,7 @@
     </p:spTree>
     <p:extLst>
       <p:ext uri="{BB962C8B-B14F-4D97-AF65-F5344CB8AC3E}">
-        <p14:creationId xmlns:p14="http://schemas.microsoft.com/office/powerpoint/2010/main" val="40464602"/>
+        <p14:creationId xmlns:p14="http://schemas.microsoft.com/office/powerpoint/2010/main" val="2694667736"/>
       </p:ext>
     </p:extLst>
   </p:cSld>
@@ -7280,7 +7591,7 @@
           <a:p>
             <a:r>
               <a:rPr lang="en-US" dirty="0" err="1" smtClean="0"/>
-              <a:t>Conclusão</a:t>
+              <a:t>Cenário</a:t>
             </a:r>
             <a:endParaRPr lang="pt-BR" dirty="0"/>
           </a:p>
@@ -7288,7 +7599,7 @@
       </p:sp>
       <p:sp>
         <p:nvSpPr>
-          <p:cNvPr id="3" name="Espaço Reservado para Conteúdo 2"/>
+          <p:cNvPr id="7" name="Text Placeholder 6"/>
           <p:cNvSpPr>
             <a:spLocks noGrp="1"/>
           </p:cNvSpPr>
@@ -7298,8 +7609,82 @@
         </p:nvSpPr>
         <p:spPr/>
         <p:txBody>
-          <a:bodyPr/>
-          <a:lstStyle/>
+          <a:bodyPr>
+            <a:normAutofit/>
+          </a:bodyPr>
+          <a:lstStyle/>
+          <a:p>
+            <a:pPr marL="285750" indent="-285750">
+              <a:buFont typeface="Wingdings" panose="05000000000000000000" pitchFamily="2" charset="2"/>
+              <a:buChar char="Ø"/>
+            </a:pPr>
+            <a:r>
+              <a:rPr lang="pt-BR" dirty="0" smtClean="0"/>
+              <a:t>Criação </a:t>
+            </a:r>
+            <a:r>
+              <a:rPr lang="pt-BR" dirty="0"/>
+              <a:t>de um sistema web para venda de cambio online </a:t>
+            </a:r>
+            <a:r>
+              <a:rPr lang="pt-BR" dirty="0" smtClean="0"/>
+              <a:t> smartcambio.com.br)</a:t>
+            </a:r>
+          </a:p>
+          <a:p>
+            <a:pPr marL="285750" indent="-285750">
+              <a:buFont typeface="Wingdings" panose="05000000000000000000" pitchFamily="2" charset="2"/>
+              <a:buChar char="Ø"/>
+            </a:pPr>
+            <a:r>
+              <a:rPr lang="pt-BR" dirty="0" smtClean="0"/>
+              <a:t>Atualização </a:t>
+            </a:r>
+            <a:r>
+              <a:rPr lang="pt-BR" dirty="0"/>
+              <a:t>das taxas de moedas a serem </a:t>
+            </a:r>
+            <a:r>
+              <a:rPr lang="pt-BR" dirty="0" smtClean="0"/>
+              <a:t>vendidas</a:t>
+            </a:r>
+          </a:p>
+          <a:p>
+            <a:pPr marL="285750" indent="-285750">
+              <a:buFont typeface="Wingdings" panose="05000000000000000000" pitchFamily="2" charset="2"/>
+              <a:buChar char="Ø"/>
+            </a:pPr>
+            <a:r>
+              <a:rPr lang="pt-BR" dirty="0"/>
+              <a:t>C</a:t>
+            </a:r>
+            <a:r>
+              <a:rPr lang="pt-BR" dirty="0" smtClean="0"/>
+              <a:t>ompra </a:t>
+            </a:r>
+            <a:r>
+              <a:rPr lang="pt-BR" dirty="0"/>
+              <a:t>de cambio apresenta uma validade de </a:t>
+            </a:r>
+            <a:r>
+              <a:rPr lang="pt-BR" dirty="0" smtClean="0"/>
+              <a:t>2 dias</a:t>
+            </a:r>
+          </a:p>
+          <a:p>
+            <a:pPr marL="285750" indent="-285750">
+              <a:buFont typeface="Wingdings" panose="05000000000000000000" pitchFamily="2" charset="2"/>
+              <a:buChar char="Ø"/>
+            </a:pPr>
+            <a:endParaRPr lang="pt-BR" dirty="0" smtClean="0"/>
+          </a:p>
+          <a:p>
+            <a:pPr marL="285750" indent="-285750">
+              <a:buFont typeface="Wingdings" panose="05000000000000000000" pitchFamily="2" charset="2"/>
+              <a:buChar char="Ø"/>
+            </a:pPr>
+            <a:endParaRPr lang="pt-BR" dirty="0"/>
+          </a:p>
           <a:p>
             <a:endParaRPr lang="pt-BR" dirty="0"/>
           </a:p>
@@ -7328,10 +7713,498 @@
           </a:p>
         </p:txBody>
       </p:sp>
+      <p:pic>
+        <p:nvPicPr>
+          <p:cNvPr id="12" name="Picture 11"/>
+          <p:cNvPicPr>
+            <a:picLocks noChangeAspect="1"/>
+          </p:cNvPicPr>
+          <p:nvPr/>
+        </p:nvPicPr>
+        <p:blipFill>
+          <a:blip r:embed="rId2"/>
+          <a:stretch>
+            <a:fillRect/>
+          </a:stretch>
+        </p:blipFill>
+        <p:spPr>
+          <a:xfrm>
+            <a:off x="1323869" y="3736870"/>
+            <a:ext cx="5698756" cy="2766420"/>
+          </a:xfrm>
+          <a:prstGeom prst="rect">
+            <a:avLst/>
+          </a:prstGeom>
+        </p:spPr>
+      </p:pic>
+      <p:pic>
+        <p:nvPicPr>
+          <p:cNvPr id="6" name="Picture 5"/>
+          <p:cNvPicPr>
+            <a:picLocks noChangeAspect="1"/>
+          </p:cNvPicPr>
+          <p:nvPr/>
+        </p:nvPicPr>
+        <p:blipFill>
+          <a:blip r:embed="rId3"/>
+          <a:stretch>
+            <a:fillRect/>
+          </a:stretch>
+        </p:blipFill>
+        <p:spPr>
+          <a:xfrm>
+            <a:off x="4732007" y="3915326"/>
+            <a:ext cx="5786582" cy="2851200"/>
+          </a:xfrm>
+          <a:prstGeom prst="rect">
+            <a:avLst/>
+          </a:prstGeom>
+        </p:spPr>
+      </p:pic>
     </p:spTree>
     <p:extLst>
       <p:ext uri="{BB962C8B-B14F-4D97-AF65-F5344CB8AC3E}">
-        <p14:creationId xmlns:p14="http://schemas.microsoft.com/office/powerpoint/2010/main" val="4177110073"/>
+        <p14:creationId xmlns:p14="http://schemas.microsoft.com/office/powerpoint/2010/main" val="1936479153"/>
+      </p:ext>
+    </p:extLst>
+  </p:cSld>
+  <p:clrMapOvr>
+    <a:masterClrMapping/>
+  </p:clrMapOvr>
+  <p:transition spd="slow">
+    <p:cover/>
+  </p:transition>
+  <p:timing>
+    <p:tnLst>
+      <p:par>
+        <p:cTn id="1" dur="indefinite" restart="never" nodeType="tmRoot"/>
+      </p:par>
+    </p:tnLst>
+  </p:timing>
+</p:sld>
+</file>
+
+<file path=ppt/slides/slide16.xml><?xml version="1.0" encoding="utf-8"?>
+<p:sld xmlns:a="http://schemas.openxmlformats.org/drawingml/2006/main" xmlns:r="http://schemas.openxmlformats.org/officeDocument/2006/relationships" xmlns:p="http://schemas.openxmlformats.org/presentationml/2006/main">
+  <p:cSld>
+    <p:spTree>
+      <p:nvGrpSpPr>
+        <p:cNvPr id="1" name=""/>
+        <p:cNvGrpSpPr/>
+        <p:nvPr/>
+      </p:nvGrpSpPr>
+      <p:grpSpPr>
+        <a:xfrm>
+          <a:off x="0" y="0"/>
+          <a:ext cx="0" cy="0"/>
+          <a:chOff x="0" y="0"/>
+          <a:chExt cx="0" cy="0"/>
+        </a:xfrm>
+      </p:grpSpPr>
+      <p:sp>
+        <p:nvSpPr>
+          <p:cNvPr id="2" name="Título 1"/>
+          <p:cNvSpPr>
+            <a:spLocks noGrp="1"/>
+          </p:cNvSpPr>
+          <p:nvPr>
+            <p:ph type="title"/>
+          </p:nvPr>
+        </p:nvSpPr>
+        <p:spPr/>
+        <p:txBody>
+          <a:bodyPr/>
+          <a:lstStyle/>
+          <a:p>
+            <a:r>
+              <a:rPr lang="en-US" dirty="0" err="1" smtClean="0"/>
+              <a:t>Descrição</a:t>
+            </a:r>
+            <a:r>
+              <a:rPr lang="en-US" dirty="0" smtClean="0"/>
+              <a:t> dos testes</a:t>
+            </a:r>
+            <a:endParaRPr lang="pt-BR" dirty="0"/>
+          </a:p>
+        </p:txBody>
+      </p:sp>
+      <p:sp>
+        <p:nvSpPr>
+          <p:cNvPr id="3" name="Espaço Reservado para Conteúdo 2"/>
+          <p:cNvSpPr>
+            <a:spLocks noGrp="1"/>
+          </p:cNvSpPr>
+          <p:nvPr>
+            <p:ph idx="1"/>
+          </p:nvPr>
+        </p:nvSpPr>
+        <p:spPr/>
+        <p:txBody>
+          <a:bodyPr/>
+          <a:lstStyle/>
+          <a:p>
+            <a:endParaRPr lang="pt-BR" dirty="0"/>
+          </a:p>
+        </p:txBody>
+      </p:sp>
+      <p:sp>
+        <p:nvSpPr>
+          <p:cNvPr id="4" name="Espaço Reservado para Número de Slide 3"/>
+          <p:cNvSpPr>
+            <a:spLocks noGrp="1"/>
+          </p:cNvSpPr>
+          <p:nvPr>
+            <p:ph type="sldNum" sz="quarter" idx="12"/>
+          </p:nvPr>
+        </p:nvSpPr>
+        <p:spPr/>
+        <p:txBody>
+          <a:bodyPr/>
+          <a:lstStyle/>
+          <a:p>
+            <a:fld id="{B2372444-1707-4BD8-BE0A-F9F461ED2C3C}" type="slidenum">
+              <a:rPr lang="pt-BR" smtClean="0"/>
+              <a:t>16</a:t>
+            </a:fld>
+            <a:endParaRPr lang="pt-BR"/>
+          </a:p>
+        </p:txBody>
+      </p:sp>
+    </p:spTree>
+    <p:extLst>
+      <p:ext uri="{BB962C8B-B14F-4D97-AF65-F5344CB8AC3E}">
+        <p14:creationId xmlns:p14="http://schemas.microsoft.com/office/powerpoint/2010/main" val="2450203372"/>
+      </p:ext>
+    </p:extLst>
+  </p:cSld>
+  <p:clrMapOvr>
+    <a:masterClrMapping/>
+  </p:clrMapOvr>
+  <p:transition spd="slow">
+    <p:cover/>
+  </p:transition>
+  <p:timing>
+    <p:tnLst>
+      <p:par>
+        <p:cTn id="1" dur="indefinite" restart="never" nodeType="tmRoot"/>
+      </p:par>
+    </p:tnLst>
+  </p:timing>
+</p:sld>
+</file>
+
+<file path=ppt/slides/slide17.xml><?xml version="1.0" encoding="utf-8"?>
+<p:sld xmlns:a="http://schemas.openxmlformats.org/drawingml/2006/main" xmlns:r="http://schemas.openxmlformats.org/officeDocument/2006/relationships" xmlns:p="http://schemas.openxmlformats.org/presentationml/2006/main">
+  <p:cSld>
+    <p:spTree>
+      <p:nvGrpSpPr>
+        <p:cNvPr id="1" name=""/>
+        <p:cNvGrpSpPr/>
+        <p:nvPr/>
+      </p:nvGrpSpPr>
+      <p:grpSpPr>
+        <a:xfrm>
+          <a:off x="0" y="0"/>
+          <a:ext cx="0" cy="0"/>
+          <a:chOff x="0" y="0"/>
+          <a:chExt cx="0" cy="0"/>
+        </a:xfrm>
+      </p:grpSpPr>
+      <p:sp>
+        <p:nvSpPr>
+          <p:cNvPr id="2" name="Título 1"/>
+          <p:cNvSpPr>
+            <a:spLocks noGrp="1"/>
+          </p:cNvSpPr>
+          <p:nvPr>
+            <p:ph type="title"/>
+          </p:nvPr>
+        </p:nvSpPr>
+        <p:spPr/>
+        <p:txBody>
+          <a:bodyPr/>
+          <a:lstStyle/>
+          <a:p>
+            <a:r>
+              <a:rPr lang="en-US" dirty="0" err="1" smtClean="0"/>
+              <a:t>Modelagem</a:t>
+            </a:r>
+            <a:r>
+              <a:rPr lang="en-US" dirty="0" smtClean="0"/>
+              <a:t>: MySQL</a:t>
+            </a:r>
+            <a:endParaRPr lang="pt-BR" dirty="0"/>
+          </a:p>
+        </p:txBody>
+      </p:sp>
+      <p:sp>
+        <p:nvSpPr>
+          <p:cNvPr id="3" name="Espaço Reservado para Conteúdo 2"/>
+          <p:cNvSpPr>
+            <a:spLocks noGrp="1"/>
+          </p:cNvSpPr>
+          <p:nvPr>
+            <p:ph idx="1"/>
+          </p:nvPr>
+        </p:nvSpPr>
+        <p:spPr/>
+        <p:txBody>
+          <a:bodyPr/>
+          <a:lstStyle/>
+          <a:p>
+            <a:endParaRPr lang="pt-BR"/>
+          </a:p>
+        </p:txBody>
+      </p:sp>
+      <p:sp>
+        <p:nvSpPr>
+          <p:cNvPr id="4" name="Espaço Reservado para Número de Slide 3"/>
+          <p:cNvSpPr>
+            <a:spLocks noGrp="1"/>
+          </p:cNvSpPr>
+          <p:nvPr>
+            <p:ph type="sldNum" sz="quarter" idx="12"/>
+          </p:nvPr>
+        </p:nvSpPr>
+        <p:spPr/>
+        <p:txBody>
+          <a:bodyPr/>
+          <a:lstStyle/>
+          <a:p>
+            <a:fld id="{B2372444-1707-4BD8-BE0A-F9F461ED2C3C}" type="slidenum">
+              <a:rPr lang="pt-BR" smtClean="0"/>
+              <a:t>17</a:t>
+            </a:fld>
+            <a:endParaRPr lang="pt-BR"/>
+          </a:p>
+        </p:txBody>
+      </p:sp>
+    </p:spTree>
+    <p:extLst>
+      <p:ext uri="{BB962C8B-B14F-4D97-AF65-F5344CB8AC3E}">
+        <p14:creationId xmlns:p14="http://schemas.microsoft.com/office/powerpoint/2010/main" val="399667511"/>
+      </p:ext>
+    </p:extLst>
+  </p:cSld>
+  <p:clrMapOvr>
+    <a:masterClrMapping/>
+  </p:clrMapOvr>
+  <p:transition spd="slow">
+    <p:cover/>
+  </p:transition>
+  <p:timing>
+    <p:tnLst>
+      <p:par>
+        <p:cTn id="1" dur="indefinite" restart="never" nodeType="tmRoot"/>
+      </p:par>
+    </p:tnLst>
+  </p:timing>
+</p:sld>
+</file>
+
+<file path=ppt/slides/slide18.xml><?xml version="1.0" encoding="utf-8"?>
+<p:sld xmlns:a="http://schemas.openxmlformats.org/drawingml/2006/main" xmlns:r="http://schemas.openxmlformats.org/officeDocument/2006/relationships" xmlns:p="http://schemas.openxmlformats.org/presentationml/2006/main">
+  <p:cSld>
+    <p:spTree>
+      <p:nvGrpSpPr>
+        <p:cNvPr id="1" name=""/>
+        <p:cNvGrpSpPr/>
+        <p:nvPr/>
+      </p:nvGrpSpPr>
+      <p:grpSpPr>
+        <a:xfrm>
+          <a:off x="0" y="0"/>
+          <a:ext cx="0" cy="0"/>
+          <a:chOff x="0" y="0"/>
+          <a:chExt cx="0" cy="0"/>
+        </a:xfrm>
+      </p:grpSpPr>
+      <p:sp>
+        <p:nvSpPr>
+          <p:cNvPr id="2" name="Título 1"/>
+          <p:cNvSpPr>
+            <a:spLocks noGrp="1"/>
+          </p:cNvSpPr>
+          <p:nvPr>
+            <p:ph type="title"/>
+          </p:nvPr>
+        </p:nvSpPr>
+        <p:spPr/>
+        <p:txBody>
+          <a:bodyPr/>
+          <a:lstStyle/>
+          <a:p>
+            <a:r>
+              <a:rPr lang="en-US" dirty="0" err="1"/>
+              <a:t>Modelagem</a:t>
+            </a:r>
+            <a:r>
+              <a:rPr lang="en-US" dirty="0"/>
+              <a:t>: </a:t>
+            </a:r>
+            <a:r>
+              <a:rPr lang="en-US" dirty="0" smtClean="0"/>
+              <a:t>MS SQL-Server</a:t>
+            </a:r>
+            <a:endParaRPr lang="pt-BR" dirty="0"/>
+          </a:p>
+        </p:txBody>
+      </p:sp>
+      <p:sp>
+        <p:nvSpPr>
+          <p:cNvPr id="3" name="Espaço Reservado para Conteúdo 2"/>
+          <p:cNvSpPr>
+            <a:spLocks noGrp="1"/>
+          </p:cNvSpPr>
+          <p:nvPr>
+            <p:ph idx="1"/>
+          </p:nvPr>
+        </p:nvSpPr>
+        <p:spPr/>
+        <p:txBody>
+          <a:bodyPr/>
+          <a:lstStyle/>
+          <a:p>
+            <a:endParaRPr lang="pt-BR"/>
+          </a:p>
+        </p:txBody>
+      </p:sp>
+      <p:sp>
+        <p:nvSpPr>
+          <p:cNvPr id="4" name="Espaço Reservado para Número de Slide 3"/>
+          <p:cNvSpPr>
+            <a:spLocks noGrp="1"/>
+          </p:cNvSpPr>
+          <p:nvPr>
+            <p:ph type="sldNum" sz="quarter" idx="12"/>
+          </p:nvPr>
+        </p:nvSpPr>
+        <p:spPr/>
+        <p:txBody>
+          <a:bodyPr/>
+          <a:lstStyle/>
+          <a:p>
+            <a:fld id="{B2372444-1707-4BD8-BE0A-F9F461ED2C3C}" type="slidenum">
+              <a:rPr lang="pt-BR" smtClean="0"/>
+              <a:t>18</a:t>
+            </a:fld>
+            <a:endParaRPr lang="pt-BR"/>
+          </a:p>
+        </p:txBody>
+      </p:sp>
+    </p:spTree>
+    <p:extLst>
+      <p:ext uri="{BB962C8B-B14F-4D97-AF65-F5344CB8AC3E}">
+        <p14:creationId xmlns:p14="http://schemas.microsoft.com/office/powerpoint/2010/main" val="710916449"/>
+      </p:ext>
+    </p:extLst>
+  </p:cSld>
+  <p:clrMapOvr>
+    <a:masterClrMapping/>
+  </p:clrMapOvr>
+  <p:transition spd="slow">
+    <p:cover/>
+  </p:transition>
+  <p:timing>
+    <p:tnLst>
+      <p:par>
+        <p:cTn id="1" dur="indefinite" restart="never" nodeType="tmRoot"/>
+      </p:par>
+    </p:tnLst>
+  </p:timing>
+</p:sld>
+</file>
+
+<file path=ppt/slides/slide19.xml><?xml version="1.0" encoding="utf-8"?>
+<p:sld xmlns:a="http://schemas.openxmlformats.org/drawingml/2006/main" xmlns:r="http://schemas.openxmlformats.org/officeDocument/2006/relationships" xmlns:p="http://schemas.openxmlformats.org/presentationml/2006/main">
+  <p:cSld>
+    <p:spTree>
+      <p:nvGrpSpPr>
+        <p:cNvPr id="1" name=""/>
+        <p:cNvGrpSpPr/>
+        <p:nvPr/>
+      </p:nvGrpSpPr>
+      <p:grpSpPr>
+        <a:xfrm>
+          <a:off x="0" y="0"/>
+          <a:ext cx="0" cy="0"/>
+          <a:chOff x="0" y="0"/>
+          <a:chExt cx="0" cy="0"/>
+        </a:xfrm>
+      </p:grpSpPr>
+      <p:sp>
+        <p:nvSpPr>
+          <p:cNvPr id="2" name="Título 1"/>
+          <p:cNvSpPr>
+            <a:spLocks noGrp="1"/>
+          </p:cNvSpPr>
+          <p:nvPr>
+            <p:ph type="title"/>
+          </p:nvPr>
+        </p:nvSpPr>
+        <p:spPr/>
+        <p:txBody>
+          <a:bodyPr/>
+          <a:lstStyle/>
+          <a:p>
+            <a:r>
+              <a:rPr lang="en-US" dirty="0" err="1" smtClean="0"/>
+              <a:t>Conclusão</a:t>
+            </a:r>
+            <a:r>
+              <a:rPr lang="en-US" dirty="0" smtClean="0"/>
+              <a:t> dos testes</a:t>
+            </a:r>
+            <a:endParaRPr lang="pt-BR" dirty="0"/>
+          </a:p>
+        </p:txBody>
+      </p:sp>
+      <p:sp>
+        <p:nvSpPr>
+          <p:cNvPr id="3" name="Espaço Reservado para Conteúdo 2"/>
+          <p:cNvSpPr>
+            <a:spLocks noGrp="1"/>
+          </p:cNvSpPr>
+          <p:nvPr>
+            <p:ph idx="1"/>
+          </p:nvPr>
+        </p:nvSpPr>
+        <p:spPr/>
+        <p:txBody>
+          <a:bodyPr/>
+          <a:lstStyle/>
+          <a:p>
+            <a:endParaRPr lang="pt-BR"/>
+          </a:p>
+        </p:txBody>
+      </p:sp>
+      <p:sp>
+        <p:nvSpPr>
+          <p:cNvPr id="4" name="Espaço Reservado para Número de Slide 3"/>
+          <p:cNvSpPr>
+            <a:spLocks noGrp="1"/>
+          </p:cNvSpPr>
+          <p:nvPr>
+            <p:ph type="sldNum" sz="quarter" idx="12"/>
+          </p:nvPr>
+        </p:nvSpPr>
+        <p:spPr/>
+        <p:txBody>
+          <a:bodyPr/>
+          <a:lstStyle/>
+          <a:p>
+            <a:fld id="{B2372444-1707-4BD8-BE0A-F9F461ED2C3C}" type="slidenum">
+              <a:rPr lang="pt-BR" smtClean="0"/>
+              <a:t>19</a:t>
+            </a:fld>
+            <a:endParaRPr lang="pt-BR"/>
+          </a:p>
+        </p:txBody>
+      </p:sp>
+    </p:spTree>
+    <p:extLst>
+      <p:ext uri="{BB962C8B-B14F-4D97-AF65-F5344CB8AC3E}">
+        <p14:creationId xmlns:p14="http://schemas.microsoft.com/office/powerpoint/2010/main" val="40464602"/>
       </p:ext>
     </p:extLst>
   </p:cSld>
@@ -7550,6 +8423,111 @@
 </p:sld>
 </file>
 
+<file path=ppt/slides/slide20.xml><?xml version="1.0" encoding="utf-8"?>
+<p:sld xmlns:a="http://schemas.openxmlformats.org/drawingml/2006/main" xmlns:r="http://schemas.openxmlformats.org/officeDocument/2006/relationships" xmlns:p="http://schemas.openxmlformats.org/presentationml/2006/main">
+  <p:cSld>
+    <p:spTree>
+      <p:nvGrpSpPr>
+        <p:cNvPr id="1" name=""/>
+        <p:cNvGrpSpPr/>
+        <p:nvPr/>
+      </p:nvGrpSpPr>
+      <p:grpSpPr>
+        <a:xfrm>
+          <a:off x="0" y="0"/>
+          <a:ext cx="0" cy="0"/>
+          <a:chOff x="0" y="0"/>
+          <a:chExt cx="0" cy="0"/>
+        </a:xfrm>
+      </p:grpSpPr>
+      <p:sp>
+        <p:nvSpPr>
+          <p:cNvPr id="2" name="Título 1"/>
+          <p:cNvSpPr>
+            <a:spLocks noGrp="1"/>
+          </p:cNvSpPr>
+          <p:nvPr>
+            <p:ph type="title"/>
+          </p:nvPr>
+        </p:nvSpPr>
+        <p:spPr/>
+        <p:txBody>
+          <a:bodyPr/>
+          <a:lstStyle/>
+          <a:p>
+            <a:r>
+              <a:rPr lang="en-US" dirty="0" err="1" smtClean="0"/>
+              <a:t>Conclusão</a:t>
+            </a:r>
+            <a:endParaRPr lang="pt-BR" dirty="0"/>
+          </a:p>
+        </p:txBody>
+      </p:sp>
+      <p:sp>
+        <p:nvSpPr>
+          <p:cNvPr id="3" name="Espaço Reservado para Conteúdo 2"/>
+          <p:cNvSpPr>
+            <a:spLocks noGrp="1"/>
+          </p:cNvSpPr>
+          <p:nvPr>
+            <p:ph idx="1"/>
+          </p:nvPr>
+        </p:nvSpPr>
+        <p:spPr/>
+        <p:txBody>
+          <a:bodyPr/>
+          <a:lstStyle/>
+          <a:p>
+            <a:endParaRPr lang="pt-BR" dirty="0"/>
+          </a:p>
+        </p:txBody>
+      </p:sp>
+      <p:sp>
+        <p:nvSpPr>
+          <p:cNvPr id="4" name="Espaço Reservado para Número de Slide 3"/>
+          <p:cNvSpPr>
+            <a:spLocks noGrp="1"/>
+          </p:cNvSpPr>
+          <p:nvPr>
+            <p:ph type="sldNum" sz="quarter" idx="12"/>
+          </p:nvPr>
+        </p:nvSpPr>
+        <p:spPr/>
+        <p:txBody>
+          <a:bodyPr/>
+          <a:lstStyle/>
+          <a:p>
+            <a:fld id="{B2372444-1707-4BD8-BE0A-F9F461ED2C3C}" type="slidenum">
+              <a:rPr lang="pt-BR" smtClean="0"/>
+              <a:t>20</a:t>
+            </a:fld>
+            <a:endParaRPr lang="pt-BR"/>
+          </a:p>
+        </p:txBody>
+      </p:sp>
+    </p:spTree>
+    <p:extLst>
+      <p:ext uri="{BB962C8B-B14F-4D97-AF65-F5344CB8AC3E}">
+        <p14:creationId xmlns:p14="http://schemas.microsoft.com/office/powerpoint/2010/main" val="4177110073"/>
+      </p:ext>
+    </p:extLst>
+  </p:cSld>
+  <p:clrMapOvr>
+    <a:masterClrMapping/>
+  </p:clrMapOvr>
+  <p:transition spd="slow">
+    <p:cover/>
+  </p:transition>
+  <p:timing>
+    <p:tnLst>
+      <p:par>
+        <p:cTn id="1" dur="indefinite" restart="never" nodeType="tmRoot"/>
+      </p:par>
+    </p:tnLst>
+  </p:timing>
+</p:sld>
+</file>
+
 <file path=ppt/slides/slide3.xml><?xml version="1.0" encoding="utf-8"?>
 <p:sld xmlns:a="http://schemas.openxmlformats.org/drawingml/2006/main" xmlns:r="http://schemas.openxmlformats.org/officeDocument/2006/relationships" xmlns:p="http://schemas.openxmlformats.org/presentationml/2006/main">
   <p:cSld>
@@ -7569,7 +8547,7 @@
       </p:grpSpPr>
       <p:sp>
         <p:nvSpPr>
-          <p:cNvPr id="2" name="Título 1"/>
+          <p:cNvPr id="2" name="Title 1"/>
           <p:cNvSpPr>
             <a:spLocks noGrp="1"/>
           </p:cNvSpPr>
@@ -7583,53 +8561,35 @@
           <a:lstStyle/>
           <a:p>
             <a:r>
-              <a:rPr lang="en-US" dirty="0" err="1" smtClean="0"/>
-              <a:t>Tabela</a:t>
-            </a:r>
-            <a:r>
-              <a:rPr lang="en-US" dirty="0" smtClean="0"/>
-              <a:t> </a:t>
-            </a:r>
-            <a:r>
-              <a:rPr lang="en-US" dirty="0" err="1" smtClean="0"/>
-              <a:t>Comparativa</a:t>
+              <a:rPr lang="pt-BR" dirty="0" smtClean="0"/>
+              <a:t>O que banco de dados Ativos ?</a:t>
             </a:r>
             <a:endParaRPr lang="pt-BR" dirty="0"/>
           </a:p>
         </p:txBody>
       </p:sp>
-      <p:pic>
-        <p:nvPicPr>
-          <p:cNvPr id="6" name="Espaço Reservado para Conteúdo 5"/>
-          <p:cNvPicPr>
-            <a:picLocks noGrp="1" noChangeAspect="1"/>
-          </p:cNvPicPr>
+      <p:sp>
+        <p:nvSpPr>
+          <p:cNvPr id="3" name="Content Placeholder 2"/>
+          <p:cNvSpPr>
+            <a:spLocks noGrp="1"/>
+          </p:cNvSpPr>
           <p:nvPr>
             <p:ph idx="1"/>
           </p:nvPr>
-        </p:nvPicPr>
-        <p:blipFill>
-          <a:blip r:embed="rId2">
-            <a:extLst>
-              <a:ext uri="{28A0092B-C50C-407E-A947-70E740481C1C}">
-                <a14:useLocalDpi xmlns:a14="http://schemas.microsoft.com/office/drawing/2010/main" val="0"/>
-              </a:ext>
-            </a:extLst>
-          </a:blip>
-          <a:stretch>
-            <a:fillRect/>
-          </a:stretch>
-        </p:blipFill>
-        <p:spPr>
-          <a:xfrm>
-            <a:off x="847939" y="2331308"/>
-            <a:ext cx="10565025" cy="3665838"/>
-          </a:xfrm>
-        </p:spPr>
-      </p:pic>
-      <p:sp>
-        <p:nvSpPr>
-          <p:cNvPr id="7" name="Espaço Reservado para Número de Slide 6"/>
+        </p:nvSpPr>
+        <p:spPr/>
+        <p:txBody>
+          <a:bodyPr/>
+          <a:lstStyle/>
+          <a:p>
+            <a:endParaRPr lang="pt-BR"/>
+          </a:p>
+        </p:txBody>
+      </p:sp>
+      <p:sp>
+        <p:nvSpPr>
+          <p:cNvPr id="4" name="Slide Number Placeholder 3"/>
           <p:cNvSpPr>
             <a:spLocks noGrp="1"/>
           </p:cNvSpPr>
@@ -7653,7 +8613,7 @@
     </p:spTree>
     <p:extLst>
       <p:ext uri="{BB962C8B-B14F-4D97-AF65-F5344CB8AC3E}">
-        <p14:creationId xmlns:p14="http://schemas.microsoft.com/office/powerpoint/2010/main" val="3826827637"/>
+        <p14:creationId xmlns:p14="http://schemas.microsoft.com/office/powerpoint/2010/main" val="2266984676"/>
       </p:ext>
     </p:extLst>
   </p:cSld>
@@ -7706,238 +8666,53 @@
           <a:lstStyle/>
           <a:p>
             <a:r>
-              <a:rPr lang="en-US" sz="3200" dirty="0"/>
-              <a:t>Practical Applications of Triggers and Constraints: </a:t>
-            </a:r>
-            <a:r>
-              <a:rPr lang="en-US" sz="3200" dirty="0" smtClean="0"/>
-              <a:t>Successes</a:t>
-            </a:r>
-            <a:r>
-              <a:rPr lang="en-US" sz="3200" dirty="0"/>
+              <a:rPr lang="en-US" dirty="0" err="1" smtClean="0"/>
+              <a:t>Tabela</a:t>
+            </a:r>
+            <a:r>
+              <a:rPr lang="en-US" dirty="0" smtClean="0"/>
               <a:t> </a:t>
             </a:r>
             <a:r>
-              <a:rPr lang="pt-BR" sz="3200" dirty="0" err="1" smtClean="0"/>
-              <a:t>and</a:t>
-            </a:r>
-            <a:r>
-              <a:rPr lang="pt-BR" sz="3200" dirty="0" smtClean="0"/>
-              <a:t> </a:t>
-            </a:r>
-            <a:r>
-              <a:rPr lang="pt-BR" sz="3200" dirty="0" err="1"/>
-              <a:t>Lingering</a:t>
-            </a:r>
-            <a:r>
-              <a:rPr lang="pt-BR" sz="3200" dirty="0"/>
-              <a:t> </a:t>
-            </a:r>
-            <a:r>
-              <a:rPr lang="pt-BR" sz="3200" dirty="0" err="1"/>
-              <a:t>Issues</a:t>
-            </a:r>
-            <a:endParaRPr lang="pt-BR" sz="3200" dirty="0"/>
-          </a:p>
-        </p:txBody>
-      </p:sp>
-      <p:sp>
-        <p:nvSpPr>
-          <p:cNvPr id="3" name="Espaço Reservado para Conteúdo 2"/>
-          <p:cNvSpPr>
-            <a:spLocks noGrp="1"/>
-          </p:cNvSpPr>
+              <a:rPr lang="en-US" dirty="0" err="1" smtClean="0"/>
+              <a:t>Comparativa</a:t>
+            </a:r>
+            <a:endParaRPr lang="pt-BR" dirty="0"/>
+          </a:p>
+        </p:txBody>
+      </p:sp>
+      <p:pic>
+        <p:nvPicPr>
+          <p:cNvPr id="6" name="Espaço Reservado para Conteúdo 5"/>
+          <p:cNvPicPr>
+            <a:picLocks noGrp="1" noChangeAspect="1"/>
+          </p:cNvPicPr>
           <p:nvPr>
             <p:ph idx="1"/>
           </p:nvPr>
-        </p:nvSpPr>
-        <p:spPr/>
-        <p:txBody>
-          <a:bodyPr>
-            <a:normAutofit fontScale="70000" lnSpcReduction="20000"/>
-          </a:bodyPr>
-          <a:lstStyle/>
-          <a:p>
-            <a:r>
-              <a:rPr lang="pt-BR" dirty="0"/>
-              <a:t>Triggers são baseadas no modelo</a:t>
-            </a:r>
-          </a:p>
-          <a:p>
-            <a:pPr marL="0" indent="0">
-              <a:buNone/>
-            </a:pPr>
-            <a:r>
-              <a:rPr lang="pt-BR" dirty="0" smtClean="0"/>
-              <a:t>	ECA </a:t>
-            </a:r>
-            <a:r>
-              <a:rPr lang="pt-BR" dirty="0"/>
-              <a:t>(</a:t>
-            </a:r>
-            <a:r>
-              <a:rPr lang="pt-BR" dirty="0" err="1"/>
-              <a:t>Event</a:t>
-            </a:r>
-            <a:r>
-              <a:rPr lang="pt-BR" dirty="0"/>
-              <a:t> </a:t>
-            </a:r>
-            <a:r>
-              <a:rPr lang="pt-BR" dirty="0" err="1"/>
-              <a:t>Condition</a:t>
-            </a:r>
-            <a:r>
-              <a:rPr lang="pt-BR" dirty="0"/>
-              <a:t> </a:t>
-            </a:r>
-            <a:r>
-              <a:rPr lang="pt-BR" dirty="0" err="1"/>
-              <a:t>Action</a:t>
-            </a:r>
-            <a:r>
-              <a:rPr lang="pt-BR" dirty="0"/>
-              <a:t>), quando um evento ocorre</a:t>
-            </a:r>
-          </a:p>
-          <a:p>
-            <a:pPr marL="0" indent="0">
-              <a:buNone/>
-            </a:pPr>
-            <a:r>
-              <a:rPr lang="pt-BR" dirty="0" smtClean="0"/>
-              <a:t>	e </a:t>
-            </a:r>
-            <a:r>
-              <a:rPr lang="pt-BR" dirty="0"/>
-              <a:t>alguma condição associada é verdadeira, executamos uma</a:t>
-            </a:r>
-          </a:p>
-          <a:p>
-            <a:pPr marL="0" indent="0">
-              <a:buNone/>
-            </a:pPr>
-            <a:r>
-              <a:rPr lang="pt-BR" dirty="0" smtClean="0"/>
-              <a:t>	ação</a:t>
-            </a:r>
-            <a:r>
-              <a:rPr lang="pt-BR" dirty="0"/>
-              <a:t>.</a:t>
-            </a:r>
-            <a:endParaRPr lang="pt-BR" dirty="0" smtClean="0"/>
-          </a:p>
-          <a:p>
-            <a:endParaRPr lang="pt-BR" dirty="0"/>
-          </a:p>
-          <a:p>
-            <a:r>
-              <a:rPr lang="pt-BR" dirty="0" smtClean="0"/>
-              <a:t>Triggers </a:t>
-            </a:r>
-            <a:r>
-              <a:rPr lang="pt-BR" dirty="0"/>
-              <a:t>surgiram como uma forma de reação automática a</a:t>
-            </a:r>
-          </a:p>
-          <a:p>
-            <a:pPr marL="0" indent="0">
-              <a:buNone/>
-            </a:pPr>
-            <a:r>
-              <a:rPr lang="pt-BR" dirty="0" smtClean="0"/>
-              <a:t>	violações </a:t>
-            </a:r>
-            <a:r>
-              <a:rPr lang="pt-BR" dirty="0"/>
-              <a:t>de restrições de integridade, e logo foram generalizados</a:t>
-            </a:r>
-          </a:p>
-          <a:p>
-            <a:pPr marL="0" indent="0">
-              <a:buNone/>
-            </a:pPr>
-            <a:r>
-              <a:rPr lang="pt-BR" dirty="0" smtClean="0"/>
-              <a:t>	ara </a:t>
-            </a:r>
-            <a:r>
-              <a:rPr lang="pt-BR" dirty="0"/>
-              <a:t>realização de outras tarefas, se tornando o modelo</a:t>
-            </a:r>
-          </a:p>
-          <a:p>
-            <a:pPr marL="0" indent="0">
-              <a:buNone/>
-            </a:pPr>
-            <a:r>
-              <a:rPr lang="pt-BR" dirty="0" smtClean="0"/>
-              <a:t>	ECA</a:t>
-            </a:r>
-          </a:p>
-          <a:p>
-            <a:pPr marL="0" indent="0">
-              <a:buNone/>
-            </a:pPr>
-            <a:endParaRPr lang="pt-BR" dirty="0" smtClean="0"/>
-          </a:p>
-          <a:p>
-            <a:r>
-              <a:rPr lang="pt-BR" dirty="0"/>
-              <a:t>Os primeiros produtos que suportavam</a:t>
-            </a:r>
-          </a:p>
-          <a:p>
-            <a:pPr marL="0" indent="0">
-              <a:buNone/>
-            </a:pPr>
-            <a:r>
-              <a:rPr lang="pt-BR" dirty="0" smtClean="0"/>
-              <a:t>	triggers </a:t>
-            </a:r>
-            <a:r>
-              <a:rPr lang="pt-BR" dirty="0"/>
-              <a:t>surgiram no começo da década de 90, hoje em dia</a:t>
-            </a:r>
-          </a:p>
-          <a:p>
-            <a:pPr marL="0" indent="0">
-              <a:buNone/>
-            </a:pPr>
-            <a:r>
-              <a:rPr lang="pt-BR" dirty="0" smtClean="0"/>
-              <a:t>	todos </a:t>
-            </a:r>
-            <a:r>
-              <a:rPr lang="pt-BR" dirty="0"/>
-              <a:t>os vendedores de </a:t>
-            </a:r>
-            <a:r>
-              <a:rPr lang="pt-BR" dirty="0" err="1"/>
-              <a:t>SGBDs</a:t>
-            </a:r>
-            <a:r>
-              <a:rPr lang="pt-BR" dirty="0"/>
-              <a:t> relacionais tem suporte a</a:t>
-            </a:r>
-          </a:p>
-          <a:p>
-            <a:pPr marL="0" indent="0">
-              <a:buNone/>
-            </a:pPr>
-            <a:r>
-              <a:rPr lang="pt-BR" dirty="0" smtClean="0"/>
-              <a:t>	triggers</a:t>
-            </a:r>
-          </a:p>
-          <a:p>
-            <a:endParaRPr lang="pt-BR" dirty="0"/>
-          </a:p>
-        </p:txBody>
-      </p:sp>
-      <p:sp>
-        <p:nvSpPr>
-          <p:cNvPr id="4" name="Espaço Reservado para Número de Slide 3"/>
+        </p:nvPicPr>
+        <p:blipFill>
+          <a:blip r:embed="rId2">
+            <a:extLst>
+              <a:ext uri="{28A0092B-C50C-407E-A947-70E740481C1C}">
+                <a14:useLocalDpi xmlns:a14="http://schemas.microsoft.com/office/drawing/2010/main" val="0"/>
+              </a:ext>
+            </a:extLst>
+          </a:blip>
+          <a:stretch>
+            <a:fillRect/>
+          </a:stretch>
+        </p:blipFill>
+        <p:spPr>
+          <a:xfrm>
+            <a:off x="847939" y="2331308"/>
+            <a:ext cx="10565025" cy="3665838"/>
+          </a:xfrm>
+        </p:spPr>
+      </p:pic>
+      <p:sp>
+        <p:nvSpPr>
+          <p:cNvPr id="7" name="Espaço Reservado para Número de Slide 6"/>
           <p:cNvSpPr>
             <a:spLocks noGrp="1"/>
           </p:cNvSpPr>
@@ -7961,7 +8736,7 @@
     </p:spTree>
     <p:extLst>
       <p:ext uri="{BB962C8B-B14F-4D97-AF65-F5344CB8AC3E}">
-        <p14:creationId xmlns:p14="http://schemas.microsoft.com/office/powerpoint/2010/main" val="259390250"/>
+        <p14:creationId xmlns:p14="http://schemas.microsoft.com/office/powerpoint/2010/main" val="3826827637"/>
       </p:ext>
     </p:extLst>
   </p:cSld>
@@ -8014,179 +8789,238 @@
           <a:lstStyle/>
           <a:p>
             <a:r>
-              <a:rPr lang="en-US" dirty="0" err="1" smtClean="0"/>
-              <a:t>Classificações</a:t>
-            </a:r>
-            <a:r>
-              <a:rPr lang="en-US" dirty="0" smtClean="0"/>
-              <a:t> de Triggers</a:t>
-            </a:r>
+              <a:rPr lang="en-US" sz="3200" dirty="0"/>
+              <a:t>Practical Applications of Triggers and Constraints: </a:t>
+            </a:r>
+            <a:r>
+              <a:rPr lang="en-US" sz="3200" dirty="0" smtClean="0"/>
+              <a:t>Successes</a:t>
+            </a:r>
+            <a:r>
+              <a:rPr lang="en-US" sz="3200" dirty="0"/>
+              <a:t> </a:t>
+            </a:r>
+            <a:r>
+              <a:rPr lang="pt-BR" sz="3200" dirty="0" err="1" smtClean="0"/>
+              <a:t>and</a:t>
+            </a:r>
+            <a:r>
+              <a:rPr lang="pt-BR" sz="3200" dirty="0" smtClean="0"/>
+              <a:t> </a:t>
+            </a:r>
+            <a:r>
+              <a:rPr lang="pt-BR" sz="3200" dirty="0" err="1"/>
+              <a:t>Lingering</a:t>
+            </a:r>
+            <a:r>
+              <a:rPr lang="pt-BR" sz="3200" dirty="0"/>
+              <a:t> </a:t>
+            </a:r>
+            <a:r>
+              <a:rPr lang="pt-BR" sz="3200" dirty="0" err="1"/>
+              <a:t>Issues</a:t>
+            </a:r>
+            <a:endParaRPr lang="pt-BR" sz="3200" dirty="0"/>
+          </a:p>
+        </p:txBody>
+      </p:sp>
+      <p:sp>
+        <p:nvSpPr>
+          <p:cNvPr id="3" name="Espaço Reservado para Conteúdo 2"/>
+          <p:cNvSpPr>
+            <a:spLocks noGrp="1"/>
+          </p:cNvSpPr>
+          <p:nvPr>
+            <p:ph idx="1"/>
+          </p:nvPr>
+        </p:nvSpPr>
+        <p:spPr/>
+        <p:txBody>
+          <a:bodyPr>
+            <a:normAutofit fontScale="70000" lnSpcReduction="20000"/>
+          </a:bodyPr>
+          <a:lstStyle/>
+          <a:p>
+            <a:r>
+              <a:rPr lang="pt-BR" dirty="0"/>
+              <a:t>Triggers são baseadas no modelo</a:t>
+            </a:r>
+          </a:p>
+          <a:p>
+            <a:pPr marL="0" indent="0">
+              <a:buNone/>
+            </a:pPr>
+            <a:r>
+              <a:rPr lang="pt-BR" dirty="0" smtClean="0"/>
+              <a:t>	ECA </a:t>
+            </a:r>
+            <a:r>
+              <a:rPr lang="pt-BR" dirty="0"/>
+              <a:t>(</a:t>
+            </a:r>
+            <a:r>
+              <a:rPr lang="pt-BR" dirty="0" err="1"/>
+              <a:t>Event</a:t>
+            </a:r>
+            <a:r>
+              <a:rPr lang="pt-BR" dirty="0"/>
+              <a:t> </a:t>
+            </a:r>
+            <a:r>
+              <a:rPr lang="pt-BR" dirty="0" err="1"/>
+              <a:t>Condition</a:t>
+            </a:r>
+            <a:r>
+              <a:rPr lang="pt-BR" dirty="0"/>
+              <a:t> </a:t>
+            </a:r>
+            <a:r>
+              <a:rPr lang="pt-BR" dirty="0" err="1"/>
+              <a:t>Action</a:t>
+            </a:r>
+            <a:r>
+              <a:rPr lang="pt-BR" dirty="0"/>
+              <a:t>), quando um evento ocorre</a:t>
+            </a:r>
+          </a:p>
+          <a:p>
+            <a:pPr marL="0" indent="0">
+              <a:buNone/>
+            </a:pPr>
+            <a:r>
+              <a:rPr lang="pt-BR" dirty="0" smtClean="0"/>
+              <a:t>	e </a:t>
+            </a:r>
+            <a:r>
+              <a:rPr lang="pt-BR" dirty="0"/>
+              <a:t>alguma condição associada é verdadeira, executamos uma</a:t>
+            </a:r>
+          </a:p>
+          <a:p>
+            <a:pPr marL="0" indent="0">
+              <a:buNone/>
+            </a:pPr>
+            <a:r>
+              <a:rPr lang="pt-BR" dirty="0" smtClean="0"/>
+              <a:t>	ação</a:t>
+            </a:r>
+            <a:r>
+              <a:rPr lang="pt-BR" dirty="0"/>
+              <a:t>.</a:t>
+            </a:r>
+            <a:endParaRPr lang="pt-BR" dirty="0" smtClean="0"/>
+          </a:p>
+          <a:p>
             <a:endParaRPr lang="pt-BR" dirty="0"/>
           </a:p>
-        </p:txBody>
-      </p:sp>
-      <p:pic>
-        <p:nvPicPr>
-          <p:cNvPr id="5" name="Espaço Reservado para Conteúdo 4"/>
-          <p:cNvPicPr>
-            <a:picLocks noGrp="1" noChangeAspect="1"/>
-          </p:cNvPicPr>
-          <p:nvPr>
-            <p:ph idx="1"/>
-          </p:nvPr>
-        </p:nvPicPr>
-        <p:blipFill>
-          <a:blip r:embed="rId2">
-            <a:extLst>
-              <a:ext uri="{28A0092B-C50C-407E-A947-70E740481C1C}">
-                <a14:useLocalDpi xmlns:a14="http://schemas.microsoft.com/office/drawing/2010/main" val="0"/>
-              </a:ext>
-            </a:extLst>
-          </a:blip>
-          <a:stretch>
-            <a:fillRect/>
-          </a:stretch>
-        </p:blipFill>
-        <p:spPr>
-          <a:xfrm>
-            <a:off x="1103684" y="2379200"/>
-            <a:ext cx="8947150" cy="577016"/>
-          </a:xfrm>
-        </p:spPr>
-      </p:pic>
-      <p:sp>
-        <p:nvSpPr>
-          <p:cNvPr id="7" name="CaixaDeTexto 6"/>
-          <p:cNvSpPr txBox="1"/>
-          <p:nvPr/>
-        </p:nvSpPr>
-        <p:spPr>
-          <a:xfrm>
-            <a:off x="3558746" y="2005534"/>
-            <a:ext cx="4336444" cy="369332"/>
-          </a:xfrm>
-          <a:prstGeom prst="rect">
-            <a:avLst/>
-          </a:prstGeom>
-          <a:noFill/>
-        </p:spPr>
-        <p:txBody>
-          <a:bodyPr wrap="none" rtlCol="0">
-            <a:spAutoFit/>
-          </a:bodyPr>
-          <a:lstStyle/>
-          <a:p>
-            <a:r>
-              <a:rPr lang="en-US" dirty="0" err="1" smtClean="0"/>
-              <a:t>Classificação</a:t>
-            </a:r>
-            <a:r>
-              <a:rPr lang="en-US" dirty="0" smtClean="0"/>
-              <a:t> </a:t>
-            </a:r>
-            <a:r>
-              <a:rPr lang="en-US" dirty="0" err="1" smtClean="0"/>
-              <a:t>por</a:t>
-            </a:r>
-            <a:r>
-              <a:rPr lang="en-US" dirty="0" smtClean="0"/>
-              <a:t> </a:t>
-            </a:r>
-            <a:r>
-              <a:rPr lang="en-US" dirty="0" err="1" smtClean="0"/>
-              <a:t>criação</a:t>
-            </a:r>
-            <a:r>
-              <a:rPr lang="en-US" dirty="0" smtClean="0"/>
-              <a:t> e </a:t>
-            </a:r>
-            <a:r>
-              <a:rPr lang="en-US" dirty="0" err="1" smtClean="0"/>
-              <a:t>atuação</a:t>
-            </a:r>
+          <a:p>
+            <a:r>
+              <a:rPr lang="pt-BR" dirty="0" smtClean="0"/>
+              <a:t>Triggers </a:t>
+            </a:r>
+            <a:r>
+              <a:rPr lang="pt-BR" dirty="0"/>
+              <a:t>surgiram como uma forma de reação automática a</a:t>
+            </a:r>
+          </a:p>
+          <a:p>
+            <a:pPr marL="0" indent="0">
+              <a:buNone/>
+            </a:pPr>
+            <a:r>
+              <a:rPr lang="pt-BR" dirty="0" smtClean="0"/>
+              <a:t>	violações </a:t>
+            </a:r>
+            <a:r>
+              <a:rPr lang="pt-BR" dirty="0"/>
+              <a:t>de restrições de integridade, e logo foram generalizados</a:t>
+            </a:r>
+          </a:p>
+          <a:p>
+            <a:pPr marL="0" indent="0">
+              <a:buNone/>
+            </a:pPr>
+            <a:r>
+              <a:rPr lang="pt-BR" dirty="0" smtClean="0"/>
+              <a:t>	ara </a:t>
+            </a:r>
+            <a:r>
+              <a:rPr lang="pt-BR" dirty="0"/>
+              <a:t>realização de outras tarefas, se tornando o modelo</a:t>
+            </a:r>
+          </a:p>
+          <a:p>
+            <a:pPr marL="0" indent="0">
+              <a:buNone/>
+            </a:pPr>
+            <a:r>
+              <a:rPr lang="pt-BR" dirty="0" smtClean="0"/>
+              <a:t>	ECA</a:t>
+            </a:r>
+          </a:p>
+          <a:p>
+            <a:pPr marL="0" indent="0">
+              <a:buNone/>
+            </a:pPr>
+            <a:endParaRPr lang="pt-BR" dirty="0" smtClean="0"/>
+          </a:p>
+          <a:p>
+            <a:r>
+              <a:rPr lang="pt-BR" dirty="0"/>
+              <a:t>Os primeiros produtos que suportavam</a:t>
+            </a:r>
+          </a:p>
+          <a:p>
+            <a:pPr marL="0" indent="0">
+              <a:buNone/>
+            </a:pPr>
+            <a:r>
+              <a:rPr lang="pt-BR" dirty="0" smtClean="0"/>
+              <a:t>	triggers </a:t>
+            </a:r>
+            <a:r>
+              <a:rPr lang="pt-BR" dirty="0"/>
+              <a:t>surgiram no começo da década de 90, hoje em dia</a:t>
+            </a:r>
+          </a:p>
+          <a:p>
+            <a:pPr marL="0" indent="0">
+              <a:buNone/>
+            </a:pPr>
+            <a:r>
+              <a:rPr lang="pt-BR" dirty="0" smtClean="0"/>
+              <a:t>	todos </a:t>
+            </a:r>
+            <a:r>
+              <a:rPr lang="pt-BR" dirty="0"/>
+              <a:t>os vendedores de </a:t>
+            </a:r>
+            <a:r>
+              <a:rPr lang="pt-BR" dirty="0" err="1"/>
+              <a:t>SGBDs</a:t>
+            </a:r>
+            <a:r>
+              <a:rPr lang="pt-BR" dirty="0"/>
+              <a:t> relacionais tem suporte a</a:t>
+            </a:r>
+          </a:p>
+          <a:p>
+            <a:pPr marL="0" indent="0">
+              <a:buNone/>
+            </a:pPr>
+            <a:r>
+              <a:rPr lang="pt-BR" dirty="0" smtClean="0"/>
+              <a:t>	triggers</a:t>
+            </a:r>
+          </a:p>
+          <a:p>
             <a:endParaRPr lang="pt-BR" dirty="0"/>
           </a:p>
         </p:txBody>
       </p:sp>
       <p:sp>
         <p:nvSpPr>
-          <p:cNvPr id="8" name="CaixaDeTexto 7"/>
-          <p:cNvSpPr txBox="1"/>
-          <p:nvPr/>
-        </p:nvSpPr>
-        <p:spPr>
-          <a:xfrm>
-            <a:off x="4077489" y="3329456"/>
-            <a:ext cx="2999539" cy="369332"/>
-          </a:xfrm>
-          <a:prstGeom prst="rect">
-            <a:avLst/>
-          </a:prstGeom>
-          <a:noFill/>
-        </p:spPr>
-        <p:txBody>
-          <a:bodyPr wrap="none" rtlCol="0">
-            <a:spAutoFit/>
-          </a:bodyPr>
-          <a:lstStyle/>
-          <a:p>
-            <a:r>
-              <a:rPr lang="en-US" dirty="0" err="1" smtClean="0"/>
-              <a:t>Classificação</a:t>
-            </a:r>
-            <a:r>
-              <a:rPr lang="en-US" dirty="0"/>
-              <a:t> </a:t>
-            </a:r>
-            <a:r>
-              <a:rPr lang="en-US" dirty="0" err="1" smtClean="0"/>
-              <a:t>por</a:t>
-            </a:r>
-            <a:r>
-              <a:rPr lang="en-US" dirty="0" smtClean="0"/>
-              <a:t> </a:t>
-            </a:r>
-            <a:r>
-              <a:rPr lang="en-US" dirty="0" err="1" smtClean="0"/>
-              <a:t>função</a:t>
-            </a:r>
-            <a:endParaRPr lang="pt-BR" dirty="0"/>
-          </a:p>
-        </p:txBody>
-      </p:sp>
-      <p:pic>
-        <p:nvPicPr>
-          <p:cNvPr id="9" name="Imagem 8"/>
-          <p:cNvPicPr>
-            <a:picLocks noChangeAspect="1"/>
-          </p:cNvPicPr>
-          <p:nvPr/>
-        </p:nvPicPr>
-        <p:blipFill>
-          <a:blip r:embed="rId3">
-            <a:extLst>
-              <a:ext uri="{28A0092B-C50C-407E-A947-70E740481C1C}">
-                <a14:useLocalDpi xmlns:a14="http://schemas.microsoft.com/office/drawing/2010/main" val="0"/>
-              </a:ext>
-            </a:extLst>
-          </a:blip>
-          <a:stretch>
-            <a:fillRect/>
-          </a:stretch>
-        </p:blipFill>
-        <p:spPr>
-          <a:xfrm>
-            <a:off x="1274030" y="3698788"/>
-            <a:ext cx="8905875" cy="2076450"/>
-          </a:xfrm>
-          <a:prstGeom prst="rect">
-            <a:avLst/>
-          </a:prstGeom>
-        </p:spPr>
-      </p:pic>
-      <p:sp>
-        <p:nvSpPr>
-          <p:cNvPr id="10" name="Espaço Reservado para Número de Slide 9"/>
+          <p:cNvPr id="4" name="Espaço Reservado para Número de Slide 3"/>
           <p:cNvSpPr>
             <a:spLocks noGrp="1"/>
           </p:cNvSpPr>
@@ -8210,7 +9044,7 @@
     </p:spTree>
     <p:extLst>
       <p:ext uri="{BB962C8B-B14F-4D97-AF65-F5344CB8AC3E}">
-        <p14:creationId xmlns:p14="http://schemas.microsoft.com/office/powerpoint/2010/main" val="560072847"/>
+        <p14:creationId xmlns:p14="http://schemas.microsoft.com/office/powerpoint/2010/main" val="259390250"/>
       </p:ext>
     </p:extLst>
   </p:cSld>
@@ -8264,7 +9098,86 @@
           <a:p>
             <a:r>
               <a:rPr lang="en-US" dirty="0" err="1" smtClean="0"/>
-              <a:t>Vantagens</a:t>
+              <a:t>Classificações</a:t>
+            </a:r>
+            <a:r>
+              <a:rPr lang="en-US" dirty="0" smtClean="0"/>
+              <a:t> de Triggers</a:t>
+            </a:r>
+            <a:endParaRPr lang="pt-BR" dirty="0"/>
+          </a:p>
+        </p:txBody>
+      </p:sp>
+      <p:pic>
+        <p:nvPicPr>
+          <p:cNvPr id="5" name="Espaço Reservado para Conteúdo 4"/>
+          <p:cNvPicPr>
+            <a:picLocks noGrp="1" noChangeAspect="1"/>
+          </p:cNvPicPr>
+          <p:nvPr>
+            <p:ph idx="1"/>
+          </p:nvPr>
+        </p:nvPicPr>
+        <p:blipFill>
+          <a:blip r:embed="rId2">
+            <a:extLst>
+              <a:ext uri="{28A0092B-C50C-407E-A947-70E740481C1C}">
+                <a14:useLocalDpi xmlns:a14="http://schemas.microsoft.com/office/drawing/2010/main" val="0"/>
+              </a:ext>
+            </a:extLst>
+          </a:blip>
+          <a:stretch>
+            <a:fillRect/>
+          </a:stretch>
+        </p:blipFill>
+        <p:spPr>
+          <a:xfrm>
+            <a:off x="1103684" y="2379200"/>
+            <a:ext cx="8947150" cy="577016"/>
+          </a:xfrm>
+        </p:spPr>
+      </p:pic>
+      <p:sp>
+        <p:nvSpPr>
+          <p:cNvPr id="7" name="CaixaDeTexto 6"/>
+          <p:cNvSpPr txBox="1"/>
+          <p:nvPr/>
+        </p:nvSpPr>
+        <p:spPr>
+          <a:xfrm>
+            <a:off x="3558746" y="2005534"/>
+            <a:ext cx="4336444" cy="369332"/>
+          </a:xfrm>
+          <a:prstGeom prst="rect">
+            <a:avLst/>
+          </a:prstGeom>
+          <a:noFill/>
+        </p:spPr>
+        <p:txBody>
+          <a:bodyPr wrap="none" rtlCol="0">
+            <a:spAutoFit/>
+          </a:bodyPr>
+          <a:lstStyle/>
+          <a:p>
+            <a:r>
+              <a:rPr lang="en-US" dirty="0" err="1" smtClean="0"/>
+              <a:t>Classificação</a:t>
+            </a:r>
+            <a:r>
+              <a:rPr lang="en-US" dirty="0" smtClean="0"/>
+              <a:t> </a:t>
+            </a:r>
+            <a:r>
+              <a:rPr lang="en-US" dirty="0" err="1" smtClean="0"/>
+              <a:t>por</a:t>
+            </a:r>
+            <a:r>
+              <a:rPr lang="en-US" dirty="0" smtClean="0"/>
+              <a:t> </a:t>
+            </a:r>
+            <a:r>
+              <a:rPr lang="en-US" dirty="0" err="1" smtClean="0"/>
+              <a:t>criação</a:t>
             </a:r>
             <a:r>
               <a:rPr lang="en-US" dirty="0" smtClean="0"/>
@@ -8272,7 +9185,7 @@
             </a:r>
             <a:r>
               <a:rPr lang="en-US" dirty="0" err="1" smtClean="0"/>
-              <a:t>desvantagens</a:t>
+              <a:t>atuação</a:t>
             </a:r>
             <a:endParaRPr lang="pt-BR" dirty="0"/>
           </a:p>
@@ -8280,35 +9193,37 @@
       </p:sp>
       <p:sp>
         <p:nvSpPr>
-          <p:cNvPr id="3" name="Espaço Reservado para Conteúdo 2"/>
-          <p:cNvSpPr>
-            <a:spLocks noGrp="1"/>
-          </p:cNvSpPr>
-          <p:nvPr>
-            <p:ph idx="1"/>
-          </p:nvPr>
-        </p:nvSpPr>
-        <p:spPr/>
-        <p:txBody>
-          <a:bodyPr/>
-          <a:lstStyle/>
-          <a:p>
-            <a:r>
-              <a:rPr lang="pt-BR" dirty="0" smtClean="0"/>
-              <a:t>A grande vantagem do uso de banco de dados ativos, é a possibilidade de transferir a logica das aplicações para o banco de dados.</a:t>
-            </a:r>
-          </a:p>
-          <a:p>
-            <a:endParaRPr lang="en-US" dirty="0" smtClean="0"/>
-          </a:p>
-          <a:p>
-            <a:r>
-              <a:rPr lang="en-US" dirty="0" smtClean="0"/>
-              <a:t>Entre as </a:t>
-            </a:r>
+          <p:cNvPr id="8" name="CaixaDeTexto 7"/>
+          <p:cNvSpPr txBox="1"/>
+          <p:nvPr/>
+        </p:nvSpPr>
+        <p:spPr>
+          <a:xfrm>
+            <a:off x="4077489" y="3329456"/>
+            <a:ext cx="2999539" cy="369332"/>
+          </a:xfrm>
+          <a:prstGeom prst="rect">
+            <a:avLst/>
+          </a:prstGeom>
+          <a:noFill/>
+        </p:spPr>
+        <p:txBody>
+          <a:bodyPr wrap="none" rtlCol="0">
+            <a:spAutoFit/>
+          </a:bodyPr>
+          <a:lstStyle/>
+          <a:p>
             <a:r>
               <a:rPr lang="en-US" dirty="0" err="1" smtClean="0"/>
-              <a:t>desvantagens</a:t>
+              <a:t>Classificação</a:t>
+            </a:r>
+            <a:r>
+              <a:rPr lang="en-US" dirty="0"/>
+              <a:t> </a:t>
+            </a:r>
+            <a:r>
+              <a:rPr lang="en-US" dirty="0" err="1" smtClean="0"/>
+              <a:t>por</a:t>
             </a:r>
             <a:r>
               <a:rPr lang="en-US" dirty="0" smtClean="0"/>
@@ -8316,84 +9231,45 @@
             </a:r>
             <a:r>
               <a:rPr lang="en-US" dirty="0" err="1" smtClean="0"/>
-              <a:t>temos</a:t>
-            </a:r>
-            <a:r>
-              <a:rPr lang="en-US" dirty="0" smtClean="0"/>
-              <a:t>:</a:t>
-            </a:r>
-          </a:p>
-          <a:p>
-            <a:pPr>
-              <a:buFont typeface="Arial" panose="020B0604020202020204" pitchFamily="34" charset="0"/>
-              <a:buChar char="•"/>
-            </a:pPr>
-            <a:r>
-              <a:rPr lang="en-US" dirty="0" err="1" smtClean="0"/>
-              <a:t>Falta</a:t>
-            </a:r>
-            <a:r>
-              <a:rPr lang="en-US" dirty="0" smtClean="0"/>
-              <a:t> de </a:t>
-            </a:r>
-            <a:r>
-              <a:rPr lang="en-US" dirty="0" err="1" smtClean="0"/>
-              <a:t>padronizaçao</a:t>
-            </a:r>
-            <a:endParaRPr lang="en-US" dirty="0" smtClean="0"/>
-          </a:p>
-          <a:p>
-            <a:pPr>
-              <a:buFont typeface="Arial" panose="020B0604020202020204" pitchFamily="34" charset="0"/>
-              <a:buChar char="•"/>
-            </a:pPr>
-            <a:r>
-              <a:rPr lang="en-US" dirty="0" err="1" smtClean="0"/>
-              <a:t>Não</a:t>
-            </a:r>
-            <a:r>
-              <a:rPr lang="en-US" dirty="0" smtClean="0"/>
-              <a:t> </a:t>
-            </a:r>
-            <a:r>
-              <a:rPr lang="en-US" dirty="0" err="1" smtClean="0"/>
-              <a:t>há</a:t>
-            </a:r>
-            <a:r>
-              <a:rPr lang="en-US" dirty="0" smtClean="0"/>
-              <a:t> </a:t>
-            </a:r>
-            <a:r>
-              <a:rPr lang="en-US" dirty="0" err="1" smtClean="0"/>
-              <a:t>ferramentas</a:t>
-            </a:r>
-            <a:r>
-              <a:rPr lang="en-US" dirty="0" smtClean="0"/>
-              <a:t> para </a:t>
-            </a:r>
-            <a:r>
-              <a:rPr lang="en-US" dirty="0" err="1" smtClean="0"/>
-              <a:t>auxiliar</a:t>
-            </a:r>
-            <a:r>
-              <a:rPr lang="en-US" dirty="0" smtClean="0"/>
-              <a:t> a </a:t>
-            </a:r>
-            <a:r>
-              <a:rPr lang="en-US" dirty="0" err="1" smtClean="0"/>
-              <a:t>análise</a:t>
-            </a:r>
-            <a:r>
-              <a:rPr lang="en-US" dirty="0" smtClean="0"/>
-              <a:t> de triggers</a:t>
-            </a:r>
-            <a:endParaRPr lang="en-US" dirty="0"/>
-          </a:p>
-        </p:txBody>
-      </p:sp>
-      <p:sp>
-        <p:nvSpPr>
-          <p:cNvPr id="4" name="Espaço Reservado para Número de Slide 3"/>
+              <a:t>função</a:t>
+            </a:r>
+            <a:endParaRPr lang="pt-BR" dirty="0"/>
+          </a:p>
+        </p:txBody>
+      </p:sp>
+      <p:pic>
+        <p:nvPicPr>
+          <p:cNvPr id="9" name="Imagem 8"/>
+          <p:cNvPicPr>
+            <a:picLocks noChangeAspect="1"/>
+          </p:cNvPicPr>
+          <p:nvPr/>
+        </p:nvPicPr>
+        <p:blipFill>
+          <a:blip r:embed="rId3">
+            <a:extLst>
+              <a:ext uri="{28A0092B-C50C-407E-A947-70E740481C1C}">
+                <a14:useLocalDpi xmlns:a14="http://schemas.microsoft.com/office/drawing/2010/main" val="0"/>
+              </a:ext>
+            </a:extLst>
+          </a:blip>
+          <a:stretch>
+            <a:fillRect/>
+          </a:stretch>
+        </p:blipFill>
+        <p:spPr>
+          <a:xfrm>
+            <a:off x="1274030" y="3698788"/>
+            <a:ext cx="8905875" cy="2076450"/>
+          </a:xfrm>
+          <a:prstGeom prst="rect">
+            <a:avLst/>
+          </a:prstGeom>
+        </p:spPr>
+      </p:pic>
+      <p:sp>
+        <p:nvSpPr>
+          <p:cNvPr id="10" name="Espaço Reservado para Número de Slide 9"/>
           <p:cNvSpPr>
             <a:spLocks noGrp="1"/>
           </p:cNvSpPr>
@@ -8417,13 +9293,16 @@
     </p:spTree>
     <p:extLst>
       <p:ext uri="{BB962C8B-B14F-4D97-AF65-F5344CB8AC3E}">
-        <p14:creationId xmlns:p14="http://schemas.microsoft.com/office/powerpoint/2010/main" val="3563331347"/>
+        <p14:creationId xmlns:p14="http://schemas.microsoft.com/office/powerpoint/2010/main" val="560072847"/>
       </p:ext>
     </p:extLst>
   </p:cSld>
   <p:clrMapOvr>
     <a:masterClrMapping/>
   </p:clrMapOvr>
+  <p:transition spd="slow">
+    <p:cover/>
+  </p:transition>
   <p:timing>
     <p:tnLst>
       <p:par>
@@ -8467,18 +9346,18 @@
           <a:lstStyle/>
           <a:p>
             <a:r>
-              <a:rPr lang="en-US" sz="3200" dirty="0"/>
-              <a:t>Toward an Active Database Platform for Guiding </a:t>
-            </a:r>
-            <a:r>
-              <a:rPr lang="en-US" sz="3200" dirty="0" smtClean="0"/>
-              <a:t>Urban </a:t>
-            </a:r>
-            <a:r>
-              <a:rPr lang="pt-BR" sz="3200" dirty="0" err="1" smtClean="0"/>
-              <a:t>Pedestrians</a:t>
-            </a:r>
-            <a:endParaRPr lang="pt-BR" sz="3200" dirty="0"/>
+              <a:rPr lang="en-US" dirty="0" err="1" smtClean="0"/>
+              <a:t>Vantagens</a:t>
+            </a:r>
+            <a:r>
+              <a:rPr lang="en-US" dirty="0" smtClean="0"/>
+              <a:t> e </a:t>
+            </a:r>
+            <a:r>
+              <a:rPr lang="en-US" dirty="0" err="1" smtClean="0"/>
+              <a:t>desvantagens</a:t>
+            </a:r>
+            <a:endParaRPr lang="pt-BR" dirty="0"/>
           </a:p>
         </p:txBody>
       </p:sp>
@@ -8499,13 +9378,99 @@
           <a:p>
             <a:r>
               <a:rPr lang="pt-BR" dirty="0" smtClean="0"/>
-              <a:t>Smart Audio </a:t>
-            </a:r>
-            <a:r>
-              <a:rPr lang="pt-BR" smtClean="0"/>
-              <a:t>City Guide</a:t>
-            </a:r>
-            <a:endParaRPr lang="pt-BR" dirty="0" smtClean="0"/>
+              <a:t>A grande vantagem do uso de banco de dados ativos, é a possibilidade de transferir a logica das aplicações para o banco de dados.</a:t>
+            </a:r>
+          </a:p>
+          <a:p>
+            <a:endParaRPr lang="en-US" dirty="0" smtClean="0"/>
+          </a:p>
+          <a:p>
+            <a:r>
+              <a:rPr lang="en-US" dirty="0" smtClean="0"/>
+              <a:t>Entre as </a:t>
+            </a:r>
+            <a:r>
+              <a:rPr lang="en-US" dirty="0" err="1" smtClean="0"/>
+              <a:t>desvantagens</a:t>
+            </a:r>
+            <a:r>
+              <a:rPr lang="en-US" dirty="0" smtClean="0"/>
+              <a:t> </a:t>
+            </a:r>
+            <a:r>
+              <a:rPr lang="en-US" dirty="0" err="1" smtClean="0"/>
+              <a:t>temos</a:t>
+            </a:r>
+            <a:r>
+              <a:rPr lang="en-US" dirty="0" smtClean="0"/>
+              <a:t>:</a:t>
+            </a:r>
+          </a:p>
+          <a:p>
+            <a:pPr>
+              <a:buFont typeface="Arial" panose="020B0604020202020204" pitchFamily="34" charset="0"/>
+              <a:buChar char="•"/>
+            </a:pPr>
+            <a:r>
+              <a:rPr lang="en-US" dirty="0" err="1" smtClean="0"/>
+              <a:t>Falta</a:t>
+            </a:r>
+            <a:r>
+              <a:rPr lang="en-US" dirty="0" smtClean="0"/>
+              <a:t> de </a:t>
+            </a:r>
+            <a:r>
+              <a:rPr lang="en-US" dirty="0" err="1" smtClean="0"/>
+              <a:t>padronizaçao</a:t>
+            </a:r>
+            <a:endParaRPr lang="en-US" dirty="0" smtClean="0"/>
+          </a:p>
+          <a:p>
+            <a:pPr>
+              <a:buFont typeface="Arial" panose="020B0604020202020204" pitchFamily="34" charset="0"/>
+              <a:buChar char="•"/>
+            </a:pPr>
+            <a:r>
+              <a:rPr lang="en-US" dirty="0" err="1" smtClean="0"/>
+              <a:t>Não</a:t>
+            </a:r>
+            <a:r>
+              <a:rPr lang="en-US" dirty="0" smtClean="0"/>
+              <a:t> </a:t>
+            </a:r>
+            <a:r>
+              <a:rPr lang="en-US" dirty="0" err="1" smtClean="0"/>
+              <a:t>há</a:t>
+            </a:r>
+            <a:r>
+              <a:rPr lang="en-US" dirty="0" smtClean="0"/>
+              <a:t> </a:t>
+            </a:r>
+            <a:r>
+              <a:rPr lang="en-US" dirty="0" err="1" smtClean="0"/>
+              <a:t>ferramentas</a:t>
+            </a:r>
+            <a:r>
+              <a:rPr lang="en-US" dirty="0" smtClean="0"/>
+              <a:t> para </a:t>
+            </a:r>
+            <a:r>
+              <a:rPr lang="en-US" dirty="0" err="1" smtClean="0"/>
+              <a:t>auxiliar</a:t>
+            </a:r>
+            <a:r>
+              <a:rPr lang="en-US" dirty="0" smtClean="0"/>
+              <a:t> a </a:t>
+            </a:r>
+            <a:r>
+              <a:rPr lang="en-US" dirty="0" err="1" smtClean="0"/>
+              <a:t>análise</a:t>
+            </a:r>
+            <a:r>
+              <a:rPr lang="en-US" dirty="0" smtClean="0"/>
+              <a:t> de triggers</a:t>
+            </a:r>
+            <a:endParaRPr lang="en-US" dirty="0"/>
           </a:p>
         </p:txBody>
       </p:sp>
@@ -8535,16 +9500,13 @@
     </p:spTree>
     <p:extLst>
       <p:ext uri="{BB962C8B-B14F-4D97-AF65-F5344CB8AC3E}">
-        <p14:creationId xmlns:p14="http://schemas.microsoft.com/office/powerpoint/2010/main" val="2660420407"/>
+        <p14:creationId xmlns:p14="http://schemas.microsoft.com/office/powerpoint/2010/main" val="3563331347"/>
       </p:ext>
     </p:extLst>
   </p:cSld>
   <p:clrMapOvr>
     <a:masterClrMapping/>
   </p:clrMapOvr>
-  <p:transition spd="slow">
-    <p:cover/>
-  </p:transition>
   <p:timing>
     <p:tnLst>
       <p:par>
@@ -8588,14 +9550,18 @@
           <a:lstStyle/>
           <a:p>
             <a:r>
-              <a:rPr lang="pt-BR" sz="3600" dirty="0"/>
-              <a:t>Características </a:t>
-            </a:r>
-            <a:r>
-              <a:rPr lang="pt-BR" sz="3600" dirty="0" smtClean="0"/>
-              <a:t>técnicas: MS SQL-Server </a:t>
-            </a:r>
-            <a:endParaRPr lang="pt-BR" sz="3600" dirty="0"/>
+              <a:rPr lang="en-US" sz="3200" dirty="0"/>
+              <a:t>Toward an Active Database Platform for Guiding </a:t>
+            </a:r>
+            <a:r>
+              <a:rPr lang="en-US" sz="3200" dirty="0" smtClean="0"/>
+              <a:t>Urban </a:t>
+            </a:r>
+            <a:r>
+              <a:rPr lang="pt-BR" sz="3200" dirty="0" err="1" smtClean="0"/>
+              <a:t>Pedestrians</a:t>
+            </a:r>
+            <a:endParaRPr lang="pt-BR" sz="3200" dirty="0"/>
           </a:p>
         </p:txBody>
       </p:sp>
@@ -8614,7 +9580,18 @@
           <a:bodyPr/>
           <a:lstStyle/>
           <a:p>
-            <a:endParaRPr lang="pt-BR"/>
+            <a:r>
+              <a:rPr lang="pt-BR" dirty="0" smtClean="0"/>
+              <a:t>Motivação para esse artigo :</a:t>
+            </a:r>
+          </a:p>
+          <a:p>
+            <a:pPr lvl="1"/>
+            <a:r>
+              <a:rPr lang="pt-BR" dirty="0" smtClean="0"/>
+              <a:t>Smart Audio City Guide – Sistema Colaborativo que auxilia deficientes visuais a locomoverem em ambiente urbano.</a:t>
+            </a:r>
+            <a:endParaRPr lang="pt-BR" dirty="0" smtClean="0"/>
           </a:p>
         </p:txBody>
       </p:sp>
@@ -8644,7 +9621,7 @@
     </p:spTree>
     <p:extLst>
       <p:ext uri="{BB962C8B-B14F-4D97-AF65-F5344CB8AC3E}">
-        <p14:creationId xmlns:p14="http://schemas.microsoft.com/office/powerpoint/2010/main" val="2633023543"/>
+        <p14:creationId xmlns:p14="http://schemas.microsoft.com/office/powerpoint/2010/main" val="2660420407"/>
       </p:ext>
     </p:extLst>
   </p:cSld>
@@ -8698,11 +9675,11 @@
           <a:p>
             <a:r>
               <a:rPr lang="pt-BR" sz="3600" dirty="0"/>
-              <a:t>Características técnicas: </a:t>
+              <a:t>Características </a:t>
             </a:r>
             <a:r>
               <a:rPr lang="pt-BR" sz="3600" dirty="0" smtClean="0"/>
-              <a:t>MySQL</a:t>
+              <a:t>técnicas: MS SQL-Server </a:t>
             </a:r>
             <a:endParaRPr lang="pt-BR" sz="3600" dirty="0"/>
           </a:p>
@@ -8723,7 +9700,70 @@
           <a:bodyPr/>
           <a:lstStyle/>
           <a:p>
-            <a:endParaRPr lang="pt-BR"/>
+            <a:r>
+              <a:rPr lang="pt-BR" dirty="0" smtClean="0"/>
+              <a:t>Inicialmente,1988, foi </a:t>
+            </a:r>
+            <a:r>
+              <a:rPr lang="pt-BR" dirty="0"/>
+              <a:t>projetado para </a:t>
+            </a:r>
+            <a:r>
+              <a:rPr lang="pt-BR" dirty="0" smtClean="0"/>
+              <a:t>a plataforma </a:t>
+            </a:r>
+            <a:r>
+              <a:rPr lang="pt-BR" dirty="0"/>
+              <a:t>OS / 2 e foi desenvolvido conjuntamente </a:t>
+            </a:r>
+            <a:r>
+              <a:rPr lang="pt-BR" dirty="0" smtClean="0"/>
+              <a:t>pela Microsoft </a:t>
+            </a:r>
+            <a:r>
+              <a:rPr lang="pt-BR" dirty="0"/>
+              <a:t>e Sybase</a:t>
+            </a:r>
+            <a:r>
+              <a:rPr lang="pt-BR" dirty="0" smtClean="0"/>
+              <a:t>.</a:t>
+            </a:r>
+          </a:p>
+          <a:p>
+            <a:endParaRPr lang="pt-BR" dirty="0" smtClean="0"/>
+          </a:p>
+          <a:p>
+            <a:r>
+              <a:rPr lang="pt-BR" dirty="0" smtClean="0"/>
+              <a:t>Não é Open Source, mas apresenta uma versão grátis</a:t>
+            </a:r>
+          </a:p>
+          <a:p>
+            <a:endParaRPr lang="pt-BR" dirty="0" smtClean="0"/>
+          </a:p>
+          <a:p>
+            <a:r>
+              <a:rPr lang="pt-BR" dirty="0" smtClean="0"/>
+              <a:t>Sistema </a:t>
+            </a:r>
+            <a:r>
+              <a:rPr lang="pt-BR" dirty="0"/>
+              <a:t>Gerenciador de Banco de Dados da </a:t>
+            </a:r>
+            <a:r>
+              <a:rPr lang="pt-BR" dirty="0" smtClean="0"/>
+              <a:t>Microsoft.</a:t>
+            </a:r>
+          </a:p>
+          <a:p>
+            <a:endParaRPr lang="pt-BR" dirty="0" smtClean="0"/>
+          </a:p>
+          <a:p>
+            <a:r>
+              <a:rPr lang="pt-BR" dirty="0" smtClean="0"/>
+              <a:t>Linguagens de Consulta T-SQL e ANSI SQL.</a:t>
+            </a:r>
+            <a:endParaRPr lang="pt-BR" dirty="0"/>
           </a:p>
         </p:txBody>
       </p:sp>
@@ -8753,7 +9793,7 @@
     </p:spTree>
     <p:extLst>
       <p:ext uri="{BB962C8B-B14F-4D97-AF65-F5344CB8AC3E}">
-        <p14:creationId xmlns:p14="http://schemas.microsoft.com/office/powerpoint/2010/main" val="4206918975"/>
+        <p14:creationId xmlns:p14="http://schemas.microsoft.com/office/powerpoint/2010/main" val="2633023543"/>
       </p:ext>
     </p:extLst>
   </p:cSld>

</xml_diff>

<commit_message>
Correções na tabela comparativa
</commit_message>
<xml_diff>
--- a/apresentacao.pptx
+++ b/apresentacao.pptx
@@ -246,7 +246,7 @@
           <a:p>
             <a:fld id="{6BB15B15-C25E-44A5-AA8B-982210CB7094}" type="datetimeFigureOut">
               <a:rPr lang="pt-BR" smtClean="0"/>
-              <a:t>12/11/2013</a:t>
+              <a:t>13/11/2013</a:t>
             </a:fld>
             <a:endParaRPr lang="pt-BR"/>
           </a:p>
@@ -405,7 +405,7 @@
           <a:p>
             <a:fld id="{53070BC8-B87C-4DDF-9E69-F7B484BADD3A}" type="slidenum">
               <a:rPr lang="pt-BR" smtClean="0"/>
-              <a:t>‹#›</a:t>
+              <a:t>‹nº›</a:t>
             </a:fld>
             <a:endParaRPr lang="pt-BR"/>
           </a:p>
@@ -1893,23 +1893,217 @@
           <a:p>
             <a:r>
               <a:rPr lang="en-US" dirty="0" err="1" smtClean="0"/>
-              <a:t>Pesquisar</a:t>
-            </a:r>
+              <a:t>Acess</a:t>
+            </a:r>
+            <a:r>
+              <a:rPr lang="en-US" baseline="0" dirty="0" smtClean="0"/>
+              <a:t> -&gt; </a:t>
+            </a:r>
+            <a:r>
+              <a:rPr lang="en-US" baseline="0" dirty="0" err="1" smtClean="0"/>
+              <a:t>Baseado</a:t>
+            </a:r>
+            <a:r>
+              <a:rPr lang="en-US" baseline="0" dirty="0" smtClean="0"/>
+              <a:t> </a:t>
+            </a:r>
+            <a:r>
+              <a:rPr lang="en-US" baseline="0" dirty="0" err="1" smtClean="0"/>
+              <a:t>em</a:t>
+            </a:r>
+            <a:r>
+              <a:rPr lang="en-US" baseline="0" dirty="0" smtClean="0"/>
+              <a:t> MS Jet Engine, SGBD </a:t>
+            </a:r>
+            <a:r>
+              <a:rPr lang="en-US" baseline="0" dirty="0" err="1" smtClean="0"/>
+              <a:t>Relacional</a:t>
+            </a:r>
+            <a:r>
+              <a:rPr lang="en-US" baseline="0" dirty="0" smtClean="0"/>
+              <a:t>, </a:t>
+            </a:r>
+            <a:r>
+              <a:rPr lang="en-US" baseline="0" dirty="0" err="1" smtClean="0"/>
+              <a:t>suporta</a:t>
+            </a:r>
+            <a:r>
+              <a:rPr lang="en-US" baseline="0" dirty="0" smtClean="0"/>
+              <a:t> trigger a </a:t>
+            </a:r>
+            <a:r>
+              <a:rPr lang="en-US" baseline="0" dirty="0" err="1" smtClean="0"/>
+              <a:t>partir</a:t>
+            </a:r>
+            <a:r>
+              <a:rPr lang="en-US" baseline="0" dirty="0" smtClean="0"/>
+              <a:t> da </a:t>
+            </a:r>
+            <a:r>
+              <a:rPr lang="en-US" baseline="0" dirty="0" err="1" smtClean="0"/>
+              <a:t>versão</a:t>
+            </a:r>
+            <a:r>
+              <a:rPr lang="en-US" baseline="0" dirty="0" smtClean="0"/>
+              <a:t> 2010</a:t>
+            </a:r>
+            <a:endParaRPr lang="en-US" dirty="0" smtClean="0"/>
+          </a:p>
+          <a:p>
+            <a:pPr marL="0" marR="0" indent="0" algn="l" defTabSz="914400" rtl="0" eaLnBrk="1" fontAlgn="auto" latinLnBrk="0" hangingPunct="1">
+              <a:lnSpc>
+                <a:spcPct val="100000"/>
+              </a:lnSpc>
+              <a:spcBef>
+                <a:spcPts val="0"/>
+              </a:spcBef>
+              <a:spcAft>
+                <a:spcPts val="0"/>
+              </a:spcAft>
+              <a:buClrTx/>
+              <a:buSzTx/>
+              <a:buFontTx/>
+              <a:buNone/>
+              <a:tabLst/>
+              <a:defRPr/>
+            </a:pPr>
             <a:r>
               <a:rPr lang="en-US" dirty="0" smtClean="0"/>
+              <a:t>MSQL Server Compact</a:t>
+            </a:r>
+            <a:r>
+              <a:rPr lang="en-US" baseline="0" dirty="0" smtClean="0"/>
+              <a:t> -&gt; </a:t>
+            </a:r>
+            <a:r>
+              <a:rPr lang="en-US" baseline="0" dirty="0" err="1" smtClean="0"/>
+              <a:t>Usado</a:t>
+            </a:r>
+            <a:r>
+              <a:rPr lang="en-US" baseline="0" dirty="0" smtClean="0"/>
               <a:t> </a:t>
             </a:r>
             <a:r>
+              <a:rPr lang="en-US" baseline="0" dirty="0" err="1" smtClean="0"/>
+              <a:t>em</a:t>
+            </a:r>
+            <a:r>
+              <a:rPr lang="en-US" baseline="0" dirty="0" smtClean="0"/>
+              <a:t> </a:t>
+            </a:r>
+            <a:r>
+              <a:rPr lang="en-US" baseline="0" dirty="0" err="1" smtClean="0"/>
+              <a:t>dispositivos</a:t>
+            </a:r>
+            <a:r>
+              <a:rPr lang="en-US" baseline="0" dirty="0" smtClean="0"/>
+              <a:t> </a:t>
+            </a:r>
+            <a:r>
+              <a:rPr lang="en-US" baseline="0" dirty="0" err="1" smtClean="0"/>
+              <a:t>moveis</a:t>
+            </a:r>
+            <a:r>
+              <a:rPr lang="en-US" baseline="0" dirty="0" smtClean="0"/>
+              <a:t>, </a:t>
+            </a:r>
+            <a:r>
+              <a:rPr lang="en-US" baseline="0" dirty="0" err="1" smtClean="0"/>
+              <a:t>unico</a:t>
+            </a:r>
+            <a:r>
+              <a:rPr lang="en-US" baseline="0" dirty="0" smtClean="0"/>
+              <a:t> SGBD </a:t>
+            </a:r>
+            <a:r>
+              <a:rPr lang="en-US" baseline="0" dirty="0" err="1" smtClean="0"/>
+              <a:t>relacional</a:t>
+            </a:r>
+            <a:r>
+              <a:rPr lang="en-US" baseline="0" dirty="0" smtClean="0"/>
+              <a:t> da </a:t>
+            </a:r>
+            <a:r>
+              <a:rPr lang="en-US" baseline="0" dirty="0" err="1" smtClean="0"/>
+              <a:t>lista</a:t>
+            </a:r>
+            <a:r>
+              <a:rPr lang="en-US" baseline="0" dirty="0" smtClean="0"/>
+              <a:t> </a:t>
+            </a:r>
+            <a:r>
+              <a:rPr lang="en-US" baseline="0" dirty="0" err="1" smtClean="0"/>
+              <a:t>que</a:t>
+            </a:r>
+            <a:r>
+              <a:rPr lang="en-US" baseline="0" dirty="0" smtClean="0"/>
+              <a:t> </a:t>
+            </a:r>
+            <a:r>
+              <a:rPr lang="en-US" baseline="0" dirty="0" err="1" smtClean="0"/>
+              <a:t>nao</a:t>
+            </a:r>
+            <a:r>
+              <a:rPr lang="en-US" baseline="0" dirty="0" smtClean="0"/>
+              <a:t> </a:t>
+            </a:r>
+            <a:r>
+              <a:rPr lang="en-US" baseline="0" dirty="0" err="1" smtClean="0"/>
+              <a:t>suporta</a:t>
+            </a:r>
+            <a:r>
+              <a:rPr lang="en-US" baseline="0" dirty="0" smtClean="0"/>
+              <a:t> triggers</a:t>
+            </a:r>
+            <a:endParaRPr lang="en-US" dirty="0" smtClean="0"/>
+          </a:p>
+          <a:p>
+            <a:r>
               <a:rPr lang="en-US" dirty="0" err="1" smtClean="0"/>
-              <a:t>onet</a:t>
+              <a:t>MonetDB</a:t>
             </a:r>
             <a:r>
               <a:rPr lang="en-US" dirty="0" smtClean="0"/>
-              <a:t> e </a:t>
+              <a:t> -&gt; SGBD </a:t>
             </a:r>
             <a:r>
               <a:rPr lang="en-US" dirty="0" err="1" smtClean="0"/>
-              <a:t>xeround</a:t>
+              <a:t>orientado</a:t>
+            </a:r>
+            <a:r>
+              <a:rPr lang="en-US" dirty="0" smtClean="0"/>
+              <a:t> a </a:t>
+            </a:r>
+            <a:r>
+              <a:rPr lang="en-US" dirty="0" err="1" smtClean="0"/>
+              <a:t>colunas</a:t>
+            </a:r>
+            <a:endParaRPr lang="en-US" dirty="0" smtClean="0"/>
+          </a:p>
+          <a:p>
+            <a:r>
+              <a:rPr lang="en-US" baseline="0" dirty="0" smtClean="0"/>
+              <a:t>RDM server-&gt; </a:t>
+            </a:r>
+            <a:r>
+              <a:rPr lang="en-US" baseline="0" dirty="0" err="1" smtClean="0"/>
+              <a:t>Modelo</a:t>
+            </a:r>
+            <a:r>
+              <a:rPr lang="en-US" baseline="0" dirty="0" smtClean="0"/>
+              <a:t> </a:t>
+            </a:r>
+            <a:r>
+              <a:rPr lang="en-US" baseline="0" dirty="0" err="1" smtClean="0"/>
+              <a:t>relacional+Modelo</a:t>
+            </a:r>
+            <a:r>
+              <a:rPr lang="en-US" baseline="0" dirty="0" smtClean="0"/>
+              <a:t> de </a:t>
+            </a:r>
+            <a:r>
+              <a:rPr lang="en-US" baseline="0" dirty="0" err="1" smtClean="0"/>
+              <a:t>Rede</a:t>
             </a:r>
             <a:endParaRPr lang="pt-BR" dirty="0"/>
           </a:p>
@@ -2581,7 +2775,7 @@
           <a:p>
             <a:fld id="{DBF08CCE-BA63-43DD-9A8F-D3A34D1C207B}" type="datetime1">
               <a:rPr lang="pt-BR" smtClean="0"/>
-              <a:t>12/11/2013</a:t>
+              <a:t>13/11/2013</a:t>
             </a:fld>
             <a:endParaRPr lang="pt-BR"/>
           </a:p>
@@ -2623,7 +2817,7 @@
           <a:p>
             <a:fld id="{B2372444-1707-4BD8-BE0A-F9F461ED2C3C}" type="slidenum">
               <a:rPr lang="pt-BR" smtClean="0"/>
-              <a:t>‹#›</a:t>
+              <a:t>‹nº›</a:t>
             </a:fld>
             <a:endParaRPr lang="pt-BR"/>
           </a:p>
@@ -2856,7 +3050,7 @@
           <a:p>
             <a:fld id="{06024363-0470-4741-AE36-6E80383105AB}" type="datetime1">
               <a:rPr lang="pt-BR" smtClean="0"/>
-              <a:t>12/11/2013</a:t>
+              <a:t>13/11/2013</a:t>
             </a:fld>
             <a:endParaRPr lang="pt-BR"/>
           </a:p>
@@ -2898,7 +3092,7 @@
           <a:p>
             <a:fld id="{B2372444-1707-4BD8-BE0A-F9F461ED2C3C}" type="slidenum">
               <a:rPr lang="pt-BR" smtClean="0"/>
-              <a:t>‹#›</a:t>
+              <a:t>‹nº›</a:t>
             </a:fld>
             <a:endParaRPr lang="pt-BR"/>
           </a:p>
@@ -3050,7 +3244,7 @@
           <a:p>
             <a:fld id="{77A60394-A8B1-4D3A-95EE-445A3470BB01}" type="datetime1">
               <a:rPr lang="pt-BR" smtClean="0"/>
-              <a:t>12/11/2013</a:t>
+              <a:t>13/11/2013</a:t>
             </a:fld>
             <a:endParaRPr lang="pt-BR"/>
           </a:p>
@@ -3092,7 +3286,7 @@
           <a:p>
             <a:fld id="{B2372444-1707-4BD8-BE0A-F9F461ED2C3C}" type="slidenum">
               <a:rPr lang="pt-BR" smtClean="0"/>
-              <a:t>‹#›</a:t>
+              <a:t>‹nº›</a:t>
             </a:fld>
             <a:endParaRPr lang="pt-BR"/>
           </a:p>
@@ -3323,7 +3517,7 @@
           <a:p>
             <a:fld id="{B4062BEB-6908-4461-BBFD-3C8D133B45DE}" type="datetime1">
               <a:rPr lang="pt-BR" smtClean="0"/>
-              <a:t>12/11/2013</a:t>
+              <a:t>13/11/2013</a:t>
             </a:fld>
             <a:endParaRPr lang="pt-BR"/>
           </a:p>
@@ -3365,7 +3559,7 @@
           <a:p>
             <a:fld id="{B2372444-1707-4BD8-BE0A-F9F461ED2C3C}" type="slidenum">
               <a:rPr lang="pt-BR" smtClean="0"/>
-              <a:t>‹#›</a:t>
+              <a:t>‹nº›</a:t>
             </a:fld>
             <a:endParaRPr lang="pt-BR"/>
           </a:p>
@@ -3664,7 +3858,7 @@
           <a:p>
             <a:fld id="{B3964332-B4AD-4F85-8D69-4802F57C45BC}" type="datetime1">
               <a:rPr lang="pt-BR" smtClean="0"/>
-              <a:t>12/11/2013</a:t>
+              <a:t>13/11/2013</a:t>
             </a:fld>
             <a:endParaRPr lang="pt-BR"/>
           </a:p>
@@ -3706,7 +3900,7 @@
           <a:p>
             <a:fld id="{B2372444-1707-4BD8-BE0A-F9F461ED2C3C}" type="slidenum">
               <a:rPr lang="pt-BR" smtClean="0"/>
-              <a:t>‹#›</a:t>
+              <a:t>‹nº›</a:t>
             </a:fld>
             <a:endParaRPr lang="pt-BR"/>
           </a:p>
@@ -4287,7 +4481,7 @@
           <a:p>
             <a:fld id="{69AE6EBF-C818-4C44-849D-CA338826C5A6}" type="datetime1">
               <a:rPr lang="pt-BR" smtClean="0"/>
-              <a:t>12/11/2013</a:t>
+              <a:t>13/11/2013</a:t>
             </a:fld>
             <a:endParaRPr lang="pt-BR"/>
           </a:p>
@@ -4329,7 +4523,7 @@
           <a:p>
             <a:fld id="{B2372444-1707-4BD8-BE0A-F9F461ED2C3C}" type="slidenum">
               <a:rPr lang="pt-BR" smtClean="0"/>
-              <a:t>‹#›</a:t>
+              <a:t>‹nº›</a:t>
             </a:fld>
             <a:endParaRPr lang="pt-BR"/>
           </a:p>
@@ -5147,7 +5341,7 @@
           <a:p>
             <a:fld id="{BB9772D4-D2AD-4A47-91A1-21A4123C2DD7}" type="datetime1">
               <a:rPr lang="pt-BR" smtClean="0"/>
-              <a:t>12/11/2013</a:t>
+              <a:t>13/11/2013</a:t>
             </a:fld>
             <a:endParaRPr lang="pt-BR"/>
           </a:p>
@@ -5189,7 +5383,7 @@
           <a:p>
             <a:fld id="{B2372444-1707-4BD8-BE0A-F9F461ED2C3C}" type="slidenum">
               <a:rPr lang="pt-BR" smtClean="0"/>
-              <a:t>‹#›</a:t>
+              <a:t>‹nº›</a:t>
             </a:fld>
             <a:endParaRPr lang="pt-BR"/>
           </a:p>
@@ -5317,7 +5511,7 @@
           <a:p>
             <a:fld id="{C20E874A-693A-4E48-A655-CD7705B8EAEB}" type="datetime1">
               <a:rPr lang="pt-BR" smtClean="0"/>
-              <a:t>12/11/2013</a:t>
+              <a:t>13/11/2013</a:t>
             </a:fld>
             <a:endParaRPr lang="pt-BR"/>
           </a:p>
@@ -5359,7 +5553,7 @@
           <a:p>
             <a:fld id="{B2372444-1707-4BD8-BE0A-F9F461ED2C3C}" type="slidenum">
               <a:rPr lang="pt-BR" smtClean="0"/>
-              <a:t>‹#›</a:t>
+              <a:t>‹nº›</a:t>
             </a:fld>
             <a:endParaRPr lang="pt-BR"/>
           </a:p>
@@ -5497,7 +5691,7 @@
           <a:p>
             <a:fld id="{BBF83567-3533-42C6-90EB-AC26D68E0D24}" type="datetime1">
               <a:rPr lang="pt-BR" smtClean="0"/>
-              <a:t>12/11/2013</a:t>
+              <a:t>13/11/2013</a:t>
             </a:fld>
             <a:endParaRPr lang="pt-BR"/>
           </a:p>
@@ -5539,7 +5733,7 @@
           <a:p>
             <a:fld id="{B2372444-1707-4BD8-BE0A-F9F461ED2C3C}" type="slidenum">
               <a:rPr lang="pt-BR" smtClean="0"/>
-              <a:t>‹#›</a:t>
+              <a:t>‹nº›</a:t>
             </a:fld>
             <a:endParaRPr lang="pt-BR"/>
           </a:p>
@@ -5667,7 +5861,7 @@
           <a:p>
             <a:fld id="{F78829D3-D87A-4B4E-AC14-01FF71B3A7DA}" type="datetime1">
               <a:rPr lang="pt-BR" smtClean="0"/>
-              <a:t>12/11/2013</a:t>
+              <a:t>13/11/2013</a:t>
             </a:fld>
             <a:endParaRPr lang="pt-BR"/>
           </a:p>
@@ -5709,7 +5903,7 @@
           <a:p>
             <a:fld id="{B2372444-1707-4BD8-BE0A-F9F461ED2C3C}" type="slidenum">
               <a:rPr lang="pt-BR" smtClean="0"/>
-              <a:t>‹#›</a:t>
+              <a:t>‹nº›</a:t>
             </a:fld>
             <a:endParaRPr lang="pt-BR"/>
           </a:p>
@@ -5914,7 +6108,7 @@
           <a:p>
             <a:fld id="{080AE73B-3A2D-4149-B678-02EFD1EF2FEE}" type="datetime1">
               <a:rPr lang="pt-BR" smtClean="0"/>
-              <a:t>12/11/2013</a:t>
+              <a:t>13/11/2013</a:t>
             </a:fld>
             <a:endParaRPr lang="pt-BR"/>
           </a:p>
@@ -5956,7 +6150,7 @@
           <a:p>
             <a:fld id="{B2372444-1707-4BD8-BE0A-F9F461ED2C3C}" type="slidenum">
               <a:rPr lang="pt-BR" smtClean="0"/>
-              <a:t>‹#›</a:t>
+              <a:t>‹nº›</a:t>
             </a:fld>
             <a:endParaRPr lang="pt-BR"/>
           </a:p>
@@ -6206,7 +6400,7 @@
           <a:p>
             <a:fld id="{4B0F639E-84D1-45F0-8ABB-2CAC3569BE6A}" type="datetime1">
               <a:rPr lang="pt-BR" smtClean="0"/>
-              <a:t>12/11/2013</a:t>
+              <a:t>13/11/2013</a:t>
             </a:fld>
             <a:endParaRPr lang="pt-BR"/>
           </a:p>
@@ -6248,7 +6442,7 @@
           <a:p>
             <a:fld id="{B2372444-1707-4BD8-BE0A-F9F461ED2C3C}" type="slidenum">
               <a:rPr lang="pt-BR" smtClean="0"/>
-              <a:t>‹#›</a:t>
+              <a:t>‹nº›</a:t>
             </a:fld>
             <a:endParaRPr lang="pt-BR"/>
           </a:p>
@@ -6650,7 +6844,7 @@
           <a:p>
             <a:fld id="{1B7696E7-0894-4ADA-A91F-C3E2962BE649}" type="datetime1">
               <a:rPr lang="pt-BR" smtClean="0"/>
-              <a:t>12/11/2013</a:t>
+              <a:t>13/11/2013</a:t>
             </a:fld>
             <a:endParaRPr lang="pt-BR"/>
           </a:p>
@@ -6692,7 +6886,7 @@
           <a:p>
             <a:fld id="{B2372444-1707-4BD8-BE0A-F9F461ED2C3C}" type="slidenum">
               <a:rPr lang="pt-BR" smtClean="0"/>
-              <a:t>‹#›</a:t>
+              <a:t>‹nº›</a:t>
             </a:fld>
             <a:endParaRPr lang="pt-BR"/>
           </a:p>
@@ -6768,7 +6962,7 @@
           <a:p>
             <a:fld id="{1D764C14-78A5-4883-8329-B2F4C1B9F66B}" type="datetime1">
               <a:rPr lang="pt-BR" smtClean="0"/>
-              <a:t>12/11/2013</a:t>
+              <a:t>13/11/2013</a:t>
             </a:fld>
             <a:endParaRPr lang="pt-BR"/>
           </a:p>
@@ -6810,7 +7004,7 @@
           <a:p>
             <a:fld id="{B2372444-1707-4BD8-BE0A-F9F461ED2C3C}" type="slidenum">
               <a:rPr lang="pt-BR" smtClean="0"/>
-              <a:t>‹#›</a:t>
+              <a:t>‹nº›</a:t>
             </a:fld>
             <a:endParaRPr lang="pt-BR"/>
           </a:p>
@@ -6863,7 +7057,7 @@
           <a:p>
             <a:fld id="{51F5A4E8-7B3E-4AD0-A9BA-E82FEA173EC8}" type="datetime1">
               <a:rPr lang="pt-BR" smtClean="0"/>
-              <a:t>12/11/2013</a:t>
+              <a:t>13/11/2013</a:t>
             </a:fld>
             <a:endParaRPr lang="pt-BR"/>
           </a:p>
@@ -6905,7 +7099,7 @@
           <a:p>
             <a:fld id="{B2372444-1707-4BD8-BE0A-F9F461ED2C3C}" type="slidenum">
               <a:rPr lang="pt-BR" smtClean="0"/>
-              <a:t>‹#›</a:t>
+              <a:t>‹nº›</a:t>
             </a:fld>
             <a:endParaRPr lang="pt-BR"/>
           </a:p>
@@ -7142,7 +7336,7 @@
           <a:p>
             <a:fld id="{5C74C753-80D9-4368-A37D-925B30C93570}" type="datetime1">
               <a:rPr lang="pt-BR" smtClean="0"/>
-              <a:t>12/11/2013</a:t>
+              <a:t>13/11/2013</a:t>
             </a:fld>
             <a:endParaRPr lang="pt-BR"/>
           </a:p>
@@ -7184,7 +7378,7 @@
           <a:p>
             <a:fld id="{B2372444-1707-4BD8-BE0A-F9F461ED2C3C}" type="slidenum">
               <a:rPr lang="pt-BR" smtClean="0"/>
-              <a:t>‹#›</a:t>
+              <a:t>‹nº›</a:t>
             </a:fld>
             <a:endParaRPr lang="pt-BR"/>
           </a:p>
@@ -7417,7 +7611,7 @@
           <a:p>
             <a:fld id="{8195EF69-5C01-4C9B-BA33-6ECF029A9D4E}" type="datetime1">
               <a:rPr lang="pt-BR" smtClean="0"/>
-              <a:t>12/11/2013</a:t>
+              <a:t>13/11/2013</a:t>
             </a:fld>
             <a:endParaRPr lang="pt-BR"/>
           </a:p>
@@ -7459,7 +7653,7 @@
           <a:p>
             <a:fld id="{B2372444-1707-4BD8-BE0A-F9F461ED2C3C}" type="slidenum">
               <a:rPr lang="pt-BR" smtClean="0"/>
-              <a:t>‹#›</a:t>
+              <a:t>‹nº›</a:t>
             </a:fld>
             <a:endParaRPr lang="pt-BR"/>
           </a:p>
@@ -7846,7 +8040,7 @@
           <a:p>
             <a:fld id="{ECB666DB-724E-4A80-BDAC-E39E54527F02}" type="datetime1">
               <a:rPr lang="pt-BR" smtClean="0"/>
-              <a:t>12/11/2013</a:t>
+              <a:t>13/11/2013</a:t>
             </a:fld>
             <a:endParaRPr lang="pt-BR"/>
           </a:p>
@@ -7925,7 +8119,7 @@
           <a:p>
             <a:fld id="{B2372444-1707-4BD8-BE0A-F9F461ED2C3C}" type="slidenum">
               <a:rPr lang="pt-BR" smtClean="0"/>
-              <a:t>‹#›</a:t>
+              <a:t>‹nº›</a:t>
             </a:fld>
             <a:endParaRPr lang="pt-BR"/>
           </a:p>
@@ -11579,8 +11773,8 @@
         </p:blipFill>
         <p:spPr>
           <a:xfrm>
-            <a:off x="847939" y="2331308"/>
-            <a:ext cx="10565025" cy="3665838"/>
+            <a:off x="552972" y="2387844"/>
+            <a:ext cx="11114440" cy="3325716"/>
           </a:xfrm>
         </p:spPr>
       </p:pic>

</xml_diff>